<commit_message>
updated slideshow w/google maps
</commit_message>
<xml_diff>
--- a/resources/powerpoint/uci-rental-presentation.pptx
+++ b/resources/powerpoint/uci-rental-presentation.pptx
@@ -6,7 +6,7 @@
     <p:sldMasterId id="2147483852" r:id="rId2"/>
   </p:sldMasterIdLst>
   <p:notesMasterIdLst>
-    <p:notesMasterId r:id="rId23"/>
+    <p:notesMasterId r:id="rId24"/>
   </p:notesMasterIdLst>
   <p:sldIdLst>
     <p:sldId id="256" r:id="rId3"/>
@@ -23,12 +23,13 @@
     <p:sldId id="264" r:id="rId14"/>
     <p:sldId id="265" r:id="rId15"/>
     <p:sldId id="267" r:id="rId16"/>
-    <p:sldId id="269" r:id="rId17"/>
-    <p:sldId id="271" r:id="rId18"/>
-    <p:sldId id="270" r:id="rId19"/>
-    <p:sldId id="272" r:id="rId20"/>
-    <p:sldId id="273" r:id="rId21"/>
-    <p:sldId id="275" r:id="rId22"/>
+    <p:sldId id="277" r:id="rId17"/>
+    <p:sldId id="269" r:id="rId18"/>
+    <p:sldId id="271" r:id="rId19"/>
+    <p:sldId id="270" r:id="rId20"/>
+    <p:sldId id="272" r:id="rId21"/>
+    <p:sldId id="273" r:id="rId22"/>
+    <p:sldId id="275" r:id="rId23"/>
   </p:sldIdLst>
   <p:sldSz cx="12192000" cy="6858000"/>
   <p:notesSz cx="6858000" cy="9144000"/>
@@ -7869,6 +7870,177 @@
         </p:nvSpPr>
         <p:spPr>
           <a:xfrm>
+            <a:off x="738233" y="755780"/>
+            <a:ext cx="10715525" cy="596694"/>
+          </a:xfrm>
+        </p:spPr>
+        <p:txBody>
+          <a:bodyPr/>
+          <a:lstStyle/>
+          <a:p>
+            <a:pPr algn="ctr"/>
+            <a:r>
+              <a:rPr lang="en-US" sz="2800" dirty="0"/>
+              <a:t>The priciest, mapped.</a:t>
+            </a:r>
+            <a:br>
+              <a:rPr lang="en-US" sz="2800" dirty="0"/>
+            </a:br>
+            <a:endParaRPr lang="en-US" sz="2800" dirty="0"/>
+          </a:p>
+        </p:txBody>
+      </p:sp>
+      <p:sp>
+        <p:nvSpPr>
+          <p:cNvPr id="4" name="Title 1">
+            <a:extLst>
+              <a:ext uri="{FF2B5EF4-FFF2-40B4-BE49-F238E27FC236}">
+                <a16:creationId xmlns:a16="http://schemas.microsoft.com/office/drawing/2014/main" id="{D809BC88-0D4F-4F83-8C15-D33AA9464A03}"/>
+              </a:ext>
+            </a:extLst>
+          </p:cNvPr>
+          <p:cNvSpPr txBox="1">
+            <a:spLocks/>
+          </p:cNvSpPr>
+          <p:nvPr/>
+        </p:nvSpPr>
+        <p:spPr>
+          <a:xfrm>
+            <a:off x="738233" y="5981154"/>
+            <a:ext cx="10715525" cy="596694"/>
+          </a:xfrm>
+          <a:prstGeom prst="rect">
+            <a:avLst/>
+          </a:prstGeom>
+        </p:spPr>
+        <p:txBody>
+          <a:bodyPr vert="horz" lIns="91440" tIns="45720" rIns="91440" bIns="45720" rtlCol="0" anchor="b">
+            <a:noAutofit/>
+          </a:bodyPr>
+          <a:lstStyle>
+            <a:lvl1pPr algn="l" defTabSz="914400" rtl="0" eaLnBrk="1" latinLnBrk="0" hangingPunct="1">
+              <a:lnSpc>
+                <a:spcPct val="80000"/>
+              </a:lnSpc>
+              <a:spcBef>
+                <a:spcPct val="0"/>
+              </a:spcBef>
+              <a:buNone/>
+              <a:defRPr sz="8800" kern="1200" spc="-120" baseline="0">
+                <a:solidFill>
+                  <a:schemeClr val="tx1"/>
+                </a:solidFill>
+                <a:latin typeface="+mj-lt"/>
+                <a:ea typeface="+mj-ea"/>
+                <a:cs typeface="+mj-cs"/>
+              </a:defRPr>
+            </a:lvl1pPr>
+          </a:lstStyle>
+          <a:p>
+            <a:pPr algn="ctr"/>
+            <a:br>
+              <a:rPr lang="en-US" sz="2800" dirty="0">
+                <a:solidFill>
+                  <a:srgbClr val="FFFF00"/>
+                </a:solidFill>
+              </a:rPr>
+            </a:br>
+            <a:r>
+              <a:rPr lang="en-US" sz="2000" dirty="0"/>
+              <a:t>Atherton, CA.  Malibu, CA.  Rye, NY.  Scarsdale, NY.  Jupiter Island, FL.</a:t>
+            </a:r>
+            <a:br>
+              <a:rPr lang="en-US" sz="2000" dirty="0"/>
+            </a:br>
+            <a:r>
+              <a:rPr lang="en-US" sz="2000" dirty="0"/>
+              <a:t>If you’re currently renting in any one of these, you’re paying.  A lot.</a:t>
+            </a:r>
+            <a:br>
+              <a:rPr lang="en-US" sz="2800" dirty="0"/>
+            </a:br>
+            <a:endParaRPr lang="en-US" sz="2800" dirty="0"/>
+          </a:p>
+        </p:txBody>
+      </p:sp>
+      <p:pic>
+        <p:nvPicPr>
+          <p:cNvPr id="5" name="Picture 4">
+            <a:extLst>
+              <a:ext uri="{FF2B5EF4-FFF2-40B4-BE49-F238E27FC236}">
+                <a16:creationId xmlns:a16="http://schemas.microsoft.com/office/drawing/2014/main" id="{26FDFC4E-F5A8-4B64-A568-B3E72D2B4F11}"/>
+              </a:ext>
+            </a:extLst>
+          </p:cNvPr>
+          <p:cNvPicPr>
+            <a:picLocks noChangeAspect="1"/>
+          </p:cNvPicPr>
+          <p:nvPr/>
+        </p:nvPicPr>
+        <p:blipFill>
+          <a:blip r:embed="rId2"/>
+          <a:stretch>
+            <a:fillRect/>
+          </a:stretch>
+        </p:blipFill>
+        <p:spPr>
+          <a:xfrm>
+            <a:off x="3407805" y="1650449"/>
+            <a:ext cx="5376383" cy="3557102"/>
+          </a:xfrm>
+          <a:prstGeom prst="rect">
+            <a:avLst/>
+          </a:prstGeom>
+        </p:spPr>
+      </p:pic>
+    </p:spTree>
+    <p:extLst>
+      <p:ext uri="{BB962C8B-B14F-4D97-AF65-F5344CB8AC3E}">
+        <p14:creationId xmlns:p14="http://schemas.microsoft.com/office/powerpoint/2010/main" val="4237740462"/>
+      </p:ext>
+    </p:extLst>
+  </p:cSld>
+  <p:clrMapOvr>
+    <a:masterClrMapping/>
+  </p:clrMapOvr>
+</p:sld>
+</file>
+
+<file path=ppt/slides/slide16.xml><?xml version="1.0" encoding="utf-8"?>
+<p:sld xmlns:a="http://schemas.openxmlformats.org/drawingml/2006/main" xmlns:r="http://schemas.openxmlformats.org/officeDocument/2006/relationships" xmlns:p="http://schemas.openxmlformats.org/presentationml/2006/main">
+  <p:cSld>
+    <p:spTree>
+      <p:nvGrpSpPr>
+        <p:cNvPr id="1" name=""/>
+        <p:cNvGrpSpPr/>
+        <p:nvPr/>
+      </p:nvGrpSpPr>
+      <p:grpSpPr>
+        <a:xfrm>
+          <a:off x="0" y="0"/>
+          <a:ext cx="0" cy="0"/>
+          <a:chOff x="0" y="0"/>
+          <a:chExt cx="0" cy="0"/>
+        </a:xfrm>
+      </p:grpSpPr>
+      <p:sp>
+        <p:nvSpPr>
+          <p:cNvPr id="2" name="Title 1">
+            <a:extLst>
+              <a:ext uri="{FF2B5EF4-FFF2-40B4-BE49-F238E27FC236}">
+                <a16:creationId xmlns:a16="http://schemas.microsoft.com/office/drawing/2014/main" id="{D2B2D5AA-1A0B-485A-B6FC-427A891DA11C}"/>
+              </a:ext>
+            </a:extLst>
+          </p:cNvPr>
+          <p:cNvSpPr>
+            <a:spLocks noGrp="1"/>
+          </p:cNvSpPr>
+          <p:nvPr>
+            <p:ph type="ctrTitle"/>
+          </p:nvPr>
+        </p:nvSpPr>
+        <p:spPr>
+          <a:xfrm>
             <a:off x="738236" y="643813"/>
             <a:ext cx="10715525" cy="596694"/>
           </a:xfrm>
@@ -8008,7 +8180,7 @@
 </p:sld>
 </file>
 
-<file path=ppt/slides/slide16.xml><?xml version="1.0" encoding="utf-8"?>
+<file path=ppt/slides/slide17.xml><?xml version="1.0" encoding="utf-8"?>
 <p:sld xmlns:a="http://schemas.openxmlformats.org/drawingml/2006/main" xmlns:r="http://schemas.openxmlformats.org/officeDocument/2006/relationships" xmlns:p="http://schemas.openxmlformats.org/presentationml/2006/main">
   <p:cSld>
     <p:spTree>
@@ -8176,7 +8348,7 @@
 </p:sld>
 </file>
 
-<file path=ppt/slides/slide17.xml><?xml version="1.0" encoding="utf-8"?>
+<file path=ppt/slides/slide18.xml><?xml version="1.0" encoding="utf-8"?>
 <p:sld xmlns:a="http://schemas.openxmlformats.org/drawingml/2006/main" xmlns:r="http://schemas.openxmlformats.org/officeDocument/2006/relationships" xmlns:p="http://schemas.openxmlformats.org/presentationml/2006/main">
   <p:cSld>
     <p:spTree>
@@ -8340,7 +8512,7 @@
 </p:sld>
 </file>
 
-<file path=ppt/slides/slide18.xml><?xml version="1.0" encoding="utf-8"?>
+<file path=ppt/slides/slide19.xml><?xml version="1.0" encoding="utf-8"?>
 <p:sld xmlns:a="http://schemas.openxmlformats.org/drawingml/2006/main" xmlns:r="http://schemas.openxmlformats.org/officeDocument/2006/relationships" xmlns:p="http://schemas.openxmlformats.org/presentationml/2006/main">
   <p:cSld>
     <p:spTree>
@@ -8504,7 +8676,145 @@
 </p:sld>
 </file>
 
-<file path=ppt/slides/slide19.xml><?xml version="1.0" encoding="utf-8"?>
+<file path=ppt/slides/slide2.xml><?xml version="1.0" encoding="utf-8"?>
+<p:sld xmlns:a="http://schemas.openxmlformats.org/drawingml/2006/main" xmlns:r="http://schemas.openxmlformats.org/officeDocument/2006/relationships" xmlns:p="http://schemas.openxmlformats.org/presentationml/2006/main">
+  <p:cSld>
+    <p:spTree>
+      <p:nvGrpSpPr>
+        <p:cNvPr id="1" name=""/>
+        <p:cNvGrpSpPr/>
+        <p:nvPr/>
+      </p:nvGrpSpPr>
+      <p:grpSpPr>
+        <a:xfrm>
+          <a:off x="0" y="0"/>
+          <a:ext cx="0" cy="0"/>
+          <a:chOff x="0" y="0"/>
+          <a:chExt cx="0" cy="0"/>
+        </a:xfrm>
+      </p:grpSpPr>
+      <p:sp>
+        <p:nvSpPr>
+          <p:cNvPr id="2" name="Title 1">
+            <a:extLst>
+              <a:ext uri="{FF2B5EF4-FFF2-40B4-BE49-F238E27FC236}">
+                <a16:creationId xmlns:a16="http://schemas.microsoft.com/office/drawing/2014/main" id="{D2B2D5AA-1A0B-485A-B6FC-427A891DA11C}"/>
+              </a:ext>
+            </a:extLst>
+          </p:cNvPr>
+          <p:cNvSpPr>
+            <a:spLocks noGrp="1"/>
+          </p:cNvSpPr>
+          <p:nvPr>
+            <p:ph type="ctrTitle"/>
+          </p:nvPr>
+        </p:nvSpPr>
+        <p:spPr>
+          <a:xfrm>
+            <a:off x="603504" y="770467"/>
+            <a:ext cx="10782300" cy="4671545"/>
+          </a:xfrm>
+        </p:spPr>
+        <p:txBody>
+          <a:bodyPr/>
+          <a:lstStyle/>
+          <a:p>
+            <a:pPr algn="ctr"/>
+            <a:r>
+              <a:rPr lang="en-US" sz="2800" dirty="0"/>
+              <a:t>Our project began with a simple observation:</a:t>
+            </a:r>
+            <a:br>
+              <a:rPr lang="en-US" sz="2800" dirty="0"/>
+            </a:br>
+            <a:br>
+              <a:rPr lang="en-US" sz="2800" dirty="0"/>
+            </a:br>
+            <a:r>
+              <a:rPr lang="en-US" sz="4000" dirty="0">
+                <a:solidFill>
+                  <a:srgbClr val="FFFF00"/>
+                </a:solidFill>
+              </a:rPr>
+              <a:t>“Home rental prices are really high these days. Why?”</a:t>
+            </a:r>
+            <a:br>
+              <a:rPr lang="en-US" sz="2800" dirty="0"/>
+            </a:br>
+            <a:br>
+              <a:rPr lang="en-US" sz="2800" dirty="0"/>
+            </a:br>
+            <a:br>
+              <a:rPr lang="en-US" sz="2800" dirty="0"/>
+            </a:br>
+            <a:r>
+              <a:rPr lang="en-US" sz="2800" dirty="0"/>
+              <a:t>To delve into this, we utilized the following sources:</a:t>
+            </a:r>
+            <a:br>
+              <a:rPr lang="en-US" sz="2800" dirty="0"/>
+            </a:br>
+            <a:br>
+              <a:rPr lang="en-US" sz="2800" dirty="0"/>
+            </a:br>
+            <a:br>
+              <a:rPr lang="en-US" sz="2800" dirty="0"/>
+            </a:br>
+            <a:r>
+              <a:rPr lang="en-US" sz="2800" dirty="0">
+                <a:solidFill>
+                  <a:srgbClr val="FFFF00"/>
+                </a:solidFill>
+              </a:rPr>
+              <a:t>Kaggle (rental info for 17,000 American cities)</a:t>
+            </a:r>
+            <a:br>
+              <a:rPr lang="en-US" sz="2800" dirty="0">
+                <a:solidFill>
+                  <a:srgbClr val="FFFF00"/>
+                </a:solidFill>
+              </a:rPr>
+            </a:br>
+            <a:r>
+              <a:rPr lang="en-US" sz="2800" dirty="0">
+                <a:solidFill>
+                  <a:srgbClr val="FFFF00"/>
+                </a:solidFill>
+              </a:rPr>
+              <a:t>Zillow (additional rental and city data)</a:t>
+            </a:r>
+            <a:br>
+              <a:rPr lang="en-US" sz="2800" dirty="0">
+                <a:solidFill>
+                  <a:srgbClr val="FFFF00"/>
+                </a:solidFill>
+              </a:rPr>
+            </a:br>
+            <a:r>
+              <a:rPr lang="en-US" sz="2800" dirty="0">
+                <a:solidFill>
+                  <a:srgbClr val="FFFF00"/>
+                </a:solidFill>
+              </a:rPr>
+              <a:t>The US Census Bureau (population statistics, rental vacancy &amp; job data)</a:t>
+            </a:r>
+          </a:p>
+        </p:txBody>
+      </p:sp>
+    </p:spTree>
+    <p:extLst>
+      <p:ext uri="{BB962C8B-B14F-4D97-AF65-F5344CB8AC3E}">
+        <p14:creationId xmlns:p14="http://schemas.microsoft.com/office/powerpoint/2010/main" val="2582390284"/>
+      </p:ext>
+    </p:extLst>
+  </p:cSld>
+  <p:clrMapOvr>
+    <a:masterClrMapping/>
+  </p:clrMapOvr>
+</p:sld>
+</file>
+
+<file path=ppt/slides/slide20.xml><?xml version="1.0" encoding="utf-8"?>
 <p:sld xmlns:a="http://schemas.openxmlformats.org/drawingml/2006/main" xmlns:r="http://schemas.openxmlformats.org/officeDocument/2006/relationships" xmlns:p="http://schemas.openxmlformats.org/presentationml/2006/main">
   <p:cSld>
     <p:spTree>
@@ -8675,145 +8985,7 @@
 </p:sld>
 </file>
 
-<file path=ppt/slides/slide2.xml><?xml version="1.0" encoding="utf-8"?>
-<p:sld xmlns:a="http://schemas.openxmlformats.org/drawingml/2006/main" xmlns:r="http://schemas.openxmlformats.org/officeDocument/2006/relationships" xmlns:p="http://schemas.openxmlformats.org/presentationml/2006/main">
-  <p:cSld>
-    <p:spTree>
-      <p:nvGrpSpPr>
-        <p:cNvPr id="1" name=""/>
-        <p:cNvGrpSpPr/>
-        <p:nvPr/>
-      </p:nvGrpSpPr>
-      <p:grpSpPr>
-        <a:xfrm>
-          <a:off x="0" y="0"/>
-          <a:ext cx="0" cy="0"/>
-          <a:chOff x="0" y="0"/>
-          <a:chExt cx="0" cy="0"/>
-        </a:xfrm>
-      </p:grpSpPr>
-      <p:sp>
-        <p:nvSpPr>
-          <p:cNvPr id="2" name="Title 1">
-            <a:extLst>
-              <a:ext uri="{FF2B5EF4-FFF2-40B4-BE49-F238E27FC236}">
-                <a16:creationId xmlns:a16="http://schemas.microsoft.com/office/drawing/2014/main" id="{D2B2D5AA-1A0B-485A-B6FC-427A891DA11C}"/>
-              </a:ext>
-            </a:extLst>
-          </p:cNvPr>
-          <p:cNvSpPr>
-            <a:spLocks noGrp="1"/>
-          </p:cNvSpPr>
-          <p:nvPr>
-            <p:ph type="ctrTitle"/>
-          </p:nvPr>
-        </p:nvSpPr>
-        <p:spPr>
-          <a:xfrm>
-            <a:off x="603504" y="770467"/>
-            <a:ext cx="10782300" cy="4671545"/>
-          </a:xfrm>
-        </p:spPr>
-        <p:txBody>
-          <a:bodyPr/>
-          <a:lstStyle/>
-          <a:p>
-            <a:pPr algn="ctr"/>
-            <a:r>
-              <a:rPr lang="en-US" sz="2800" dirty="0"/>
-              <a:t>Our project began with a simple observation:</a:t>
-            </a:r>
-            <a:br>
-              <a:rPr lang="en-US" sz="2800" dirty="0"/>
-            </a:br>
-            <a:br>
-              <a:rPr lang="en-US" sz="2800" dirty="0"/>
-            </a:br>
-            <a:r>
-              <a:rPr lang="en-US" sz="4000" dirty="0">
-                <a:solidFill>
-                  <a:srgbClr val="FFFF00"/>
-                </a:solidFill>
-              </a:rPr>
-              <a:t>“Home rental prices are really high these days. Why?”</a:t>
-            </a:r>
-            <a:br>
-              <a:rPr lang="en-US" sz="2800" dirty="0"/>
-            </a:br>
-            <a:br>
-              <a:rPr lang="en-US" sz="2800" dirty="0"/>
-            </a:br>
-            <a:br>
-              <a:rPr lang="en-US" sz="2800" dirty="0"/>
-            </a:br>
-            <a:r>
-              <a:rPr lang="en-US" sz="2800" dirty="0"/>
-              <a:t>To delve into this, we utilized the following sources:</a:t>
-            </a:r>
-            <a:br>
-              <a:rPr lang="en-US" sz="2800" dirty="0"/>
-            </a:br>
-            <a:br>
-              <a:rPr lang="en-US" sz="2800" dirty="0"/>
-            </a:br>
-            <a:br>
-              <a:rPr lang="en-US" sz="2800" dirty="0"/>
-            </a:br>
-            <a:r>
-              <a:rPr lang="en-US" sz="2800" dirty="0">
-                <a:solidFill>
-                  <a:srgbClr val="FFFF00"/>
-                </a:solidFill>
-              </a:rPr>
-              <a:t>Kaggle (rental info for 17,000 American cities)</a:t>
-            </a:r>
-            <a:br>
-              <a:rPr lang="en-US" sz="2800" dirty="0">
-                <a:solidFill>
-                  <a:srgbClr val="FFFF00"/>
-                </a:solidFill>
-              </a:rPr>
-            </a:br>
-            <a:r>
-              <a:rPr lang="en-US" sz="2800" dirty="0">
-                <a:solidFill>
-                  <a:srgbClr val="FFFF00"/>
-                </a:solidFill>
-              </a:rPr>
-              <a:t>Zillow (additional rental and city data)</a:t>
-            </a:r>
-            <a:br>
-              <a:rPr lang="en-US" sz="2800" dirty="0">
-                <a:solidFill>
-                  <a:srgbClr val="FFFF00"/>
-                </a:solidFill>
-              </a:rPr>
-            </a:br>
-            <a:r>
-              <a:rPr lang="en-US" sz="2800" dirty="0">
-                <a:solidFill>
-                  <a:srgbClr val="FFFF00"/>
-                </a:solidFill>
-              </a:rPr>
-              <a:t>The US Census Bureau (population statistics, rental vacancy &amp; job data)</a:t>
-            </a:r>
-          </a:p>
-        </p:txBody>
-      </p:sp>
-    </p:spTree>
-    <p:extLst>
-      <p:ext uri="{BB962C8B-B14F-4D97-AF65-F5344CB8AC3E}">
-        <p14:creationId xmlns:p14="http://schemas.microsoft.com/office/powerpoint/2010/main" val="2582390284"/>
-      </p:ext>
-    </p:extLst>
-  </p:cSld>
-  <p:clrMapOvr>
-    <a:masterClrMapping/>
-  </p:clrMapOvr>
-</p:sld>
-</file>
-
-<file path=ppt/slides/slide20.xml><?xml version="1.0" encoding="utf-8"?>
+<file path=ppt/slides/slide21.xml><?xml version="1.0" encoding="utf-8"?>
 <p:sld xmlns:a="http://schemas.openxmlformats.org/drawingml/2006/main" xmlns:r="http://schemas.openxmlformats.org/officeDocument/2006/relationships" xmlns:p="http://schemas.openxmlformats.org/presentationml/2006/main">
   <p:cSld>
     <p:spTree>

</xml_diff>

<commit_message>
minor tweaks to powerpoint presentation
</commit_message>
<xml_diff>
--- a/resources/powerpoint/uci-rental-presentation.pptx
+++ b/resources/powerpoint/uci-rental-presentation.pptx
@@ -6,30 +6,32 @@
     <p:sldMasterId id="2147483852" r:id="rId2"/>
   </p:sldMasterIdLst>
   <p:notesMasterIdLst>
-    <p:notesMasterId r:id="rId24"/>
+    <p:notesMasterId r:id="rId26"/>
   </p:notesMasterIdLst>
   <p:sldIdLst>
     <p:sldId id="256" r:id="rId3"/>
     <p:sldId id="257" r:id="rId4"/>
     <p:sldId id="274" r:id="rId5"/>
     <p:sldId id="276" r:id="rId6"/>
-    <p:sldId id="258" r:id="rId7"/>
-    <p:sldId id="266" r:id="rId8"/>
-    <p:sldId id="259" r:id="rId9"/>
-    <p:sldId id="261" r:id="rId10"/>
-    <p:sldId id="260" r:id="rId11"/>
-    <p:sldId id="263" r:id="rId12"/>
-    <p:sldId id="268" r:id="rId13"/>
-    <p:sldId id="264" r:id="rId14"/>
-    <p:sldId id="265" r:id="rId15"/>
-    <p:sldId id="267" r:id="rId16"/>
-    <p:sldId id="277" r:id="rId17"/>
-    <p:sldId id="269" r:id="rId18"/>
-    <p:sldId id="271" r:id="rId19"/>
-    <p:sldId id="270" r:id="rId20"/>
-    <p:sldId id="272" r:id="rId21"/>
-    <p:sldId id="273" r:id="rId22"/>
-    <p:sldId id="275" r:id="rId23"/>
+    <p:sldId id="277" r:id="rId7"/>
+    <p:sldId id="258" r:id="rId8"/>
+    <p:sldId id="266" r:id="rId9"/>
+    <p:sldId id="259" r:id="rId10"/>
+    <p:sldId id="261" r:id="rId11"/>
+    <p:sldId id="260" r:id="rId12"/>
+    <p:sldId id="263" r:id="rId13"/>
+    <p:sldId id="268" r:id="rId14"/>
+    <p:sldId id="264" r:id="rId15"/>
+    <p:sldId id="265" r:id="rId16"/>
+    <p:sldId id="267" r:id="rId17"/>
+    <p:sldId id="280" r:id="rId18"/>
+    <p:sldId id="269" r:id="rId19"/>
+    <p:sldId id="271" r:id="rId20"/>
+    <p:sldId id="270" r:id="rId21"/>
+    <p:sldId id="272" r:id="rId22"/>
+    <p:sldId id="273" r:id="rId23"/>
+    <p:sldId id="275" r:id="rId24"/>
+    <p:sldId id="278" r:id="rId25"/>
   </p:sldIdLst>
   <p:sldSz cx="12192000" cy="6858000"/>
   <p:notesSz cx="6858000" cy="9144000"/>
@@ -221,7 +223,7 @@
           <a:p>
             <a:fld id="{70D0F8F9-B270-4267-A27B-03A005F50A05}" type="datetimeFigureOut">
               <a:rPr lang="en-US" smtClean="0"/>
-              <a:t>4/8/2019</a:t>
+              <a:t>4/9/2019</a:t>
             </a:fld>
             <a:endParaRPr lang="en-US"/>
           </a:p>
@@ -728,7 +730,7 @@
             <a:fld id="{5586B75A-687E-405C-8A0B-8D00578BA2C3}" type="datetimeFigureOut">
               <a:rPr lang="en-US" dirty="0"/>
               <a:pPr/>
-              <a:t>4/8/2019</a:t>
+              <a:t>4/9/2019</a:t>
             </a:fld>
             <a:endParaRPr lang="en-US" dirty="0"/>
           </a:p>
@@ -894,7 +896,7 @@
           <a:p>
             <a:fld id="{5F4E5243-F52A-4D37-9694-EB26C6C31910}" type="datetimeFigureOut">
               <a:rPr lang="en-US" dirty="0"/>
-              <a:t>4/8/2019</a:t>
+              <a:t>4/9/2019</a:t>
             </a:fld>
             <a:endParaRPr lang="en-US" dirty="0"/>
           </a:p>
@@ -1069,7 +1071,7 @@
           <a:p>
             <a:fld id="{3A77B6E1-634A-48DC-9E8B-D894023267EF}" type="datetimeFigureOut">
               <a:rPr lang="en-US" dirty="0"/>
-              <a:t>4/8/2019</a:t>
+              <a:t>4/9/2019</a:t>
             </a:fld>
             <a:endParaRPr lang="en-US" dirty="0"/>
           </a:p>
@@ -1272,7 +1274,7 @@
           <a:p>
             <a:fld id="{21DE34AB-78EC-4614-BD69-68CDC1B22548}" type="datetimeFigureOut">
               <a:rPr lang="en-US" smtClean="0"/>
-              <a:t>4/8/2019</a:t>
+              <a:t>4/9/2019</a:t>
             </a:fld>
             <a:endParaRPr lang="en-US"/>
           </a:p>
@@ -1470,7 +1472,7 @@
           <a:p>
             <a:fld id="{21DE34AB-78EC-4614-BD69-68CDC1B22548}" type="datetimeFigureOut">
               <a:rPr lang="en-US" smtClean="0"/>
-              <a:t>4/8/2019</a:t>
+              <a:t>4/9/2019</a:t>
             </a:fld>
             <a:endParaRPr lang="en-US"/>
           </a:p>
@@ -1745,7 +1747,7 @@
           <a:p>
             <a:fld id="{21DE34AB-78EC-4614-BD69-68CDC1B22548}" type="datetimeFigureOut">
               <a:rPr lang="en-US" smtClean="0"/>
-              <a:t>4/8/2019</a:t>
+              <a:t>4/9/2019</a:t>
             </a:fld>
             <a:endParaRPr lang="en-US"/>
           </a:p>
@@ -2010,7 +2012,7 @@
           <a:p>
             <a:fld id="{21DE34AB-78EC-4614-BD69-68CDC1B22548}" type="datetimeFigureOut">
               <a:rPr lang="en-US" smtClean="0"/>
-              <a:t>4/8/2019</a:t>
+              <a:t>4/9/2019</a:t>
             </a:fld>
             <a:endParaRPr lang="en-US"/>
           </a:p>
@@ -2422,7 +2424,7 @@
           <a:p>
             <a:fld id="{21DE34AB-78EC-4614-BD69-68CDC1B22548}" type="datetimeFigureOut">
               <a:rPr lang="en-US" smtClean="0"/>
-              <a:t>4/8/2019</a:t>
+              <a:t>4/9/2019</a:t>
             </a:fld>
             <a:endParaRPr lang="en-US"/>
           </a:p>
@@ -2563,7 +2565,7 @@
           <a:p>
             <a:fld id="{21DE34AB-78EC-4614-BD69-68CDC1B22548}" type="datetimeFigureOut">
               <a:rPr lang="en-US" smtClean="0"/>
-              <a:t>4/8/2019</a:t>
+              <a:t>4/9/2019</a:t>
             </a:fld>
             <a:endParaRPr lang="en-US"/>
           </a:p>
@@ -2676,7 +2678,7 @@
           <a:p>
             <a:fld id="{21DE34AB-78EC-4614-BD69-68CDC1B22548}" type="datetimeFigureOut">
               <a:rPr lang="en-US" smtClean="0"/>
-              <a:t>4/8/2019</a:t>
+              <a:t>4/9/2019</a:t>
             </a:fld>
             <a:endParaRPr lang="en-US"/>
           </a:p>
@@ -2987,7 +2989,7 @@
           <a:p>
             <a:fld id="{21DE34AB-78EC-4614-BD69-68CDC1B22548}" type="datetimeFigureOut">
               <a:rPr lang="en-US" smtClean="0"/>
-              <a:t>4/8/2019</a:t>
+              <a:t>4/9/2019</a:t>
             </a:fld>
             <a:endParaRPr lang="en-US"/>
           </a:p>
@@ -3169,7 +3171,7 @@
           <a:p>
             <a:fld id="{7B2D3E9E-A95C-48F2-B4BF-A71542E0BE9A}" type="datetimeFigureOut">
               <a:rPr lang="en-US" dirty="0"/>
-              <a:t>4/8/2019</a:t>
+              <a:t>4/9/2019</a:t>
             </a:fld>
             <a:endParaRPr lang="en-US" dirty="0"/>
           </a:p>
@@ -3440,7 +3442,7 @@
           <a:p>
             <a:fld id="{21DE34AB-78EC-4614-BD69-68CDC1B22548}" type="datetimeFigureOut">
               <a:rPr lang="en-US" smtClean="0"/>
-              <a:t>4/8/2019</a:t>
+              <a:t>4/9/2019</a:t>
             </a:fld>
             <a:endParaRPr lang="en-US"/>
           </a:p>
@@ -3638,7 +3640,7 @@
           <a:p>
             <a:fld id="{21DE34AB-78EC-4614-BD69-68CDC1B22548}" type="datetimeFigureOut">
               <a:rPr lang="en-US" smtClean="0"/>
-              <a:t>4/8/2019</a:t>
+              <a:t>4/9/2019</a:t>
             </a:fld>
             <a:endParaRPr lang="en-US"/>
           </a:p>
@@ -3846,7 +3848,7 @@
           <a:p>
             <a:fld id="{21DE34AB-78EC-4614-BD69-68CDC1B22548}" type="datetimeFigureOut">
               <a:rPr lang="en-US" smtClean="0"/>
-              <a:t>4/8/2019</a:t>
+              <a:t>4/9/2019</a:t>
             </a:fld>
             <a:endParaRPr lang="en-US"/>
           </a:p>
@@ -4123,7 +4125,7 @@
             <a:fld id="{5586B75A-687E-405C-8A0B-8D00578BA2C3}" type="datetimeFigureOut">
               <a:rPr lang="en-US" dirty="0"/>
               <a:pPr/>
-              <a:t>4/8/2019</a:t>
+              <a:t>4/9/2019</a:t>
             </a:fld>
             <a:endParaRPr lang="en-US" dirty="0"/>
           </a:p>
@@ -4407,7 +4409,7 @@
           <a:p>
             <a:fld id="{F12952B5-7A2F-4CC8-B7CE-9234E21C2837}" type="datetimeFigureOut">
               <a:rPr lang="en-US" dirty="0"/>
-              <a:t>4/8/2019</a:t>
+              <a:t>4/9/2019</a:t>
             </a:fld>
             <a:endParaRPr lang="en-US" dirty="0"/>
           </a:p>
@@ -4831,7 +4833,7 @@
           <a:p>
             <a:fld id="{CE1DA07A-9201-4B4B-BAF2-015AFA30F520}" type="datetimeFigureOut">
               <a:rPr lang="en-US" dirty="0"/>
-              <a:t>4/8/2019</a:t>
+              <a:t>4/9/2019</a:t>
             </a:fld>
             <a:endParaRPr lang="en-US" dirty="0"/>
           </a:p>
@@ -4944,7 +4946,7 @@
           <a:p>
             <a:fld id="{73D7E00A-486F-4252-8B1D-E32645521F49}" type="datetimeFigureOut">
               <a:rPr lang="en-US" dirty="0"/>
-              <a:t>4/8/2019</a:t>
+              <a:t>4/9/2019</a:t>
             </a:fld>
             <a:endParaRPr lang="en-US" dirty="0"/>
           </a:p>
@@ -5034,7 +5036,7 @@
           <a:p>
             <a:fld id="{8DDF5F92-E675-4B36-9A60-69A962A68675}" type="datetimeFigureOut">
               <a:rPr lang="en-US" dirty="0"/>
-              <a:t>4/8/2019</a:t>
+              <a:t>4/9/2019</a:t>
             </a:fld>
             <a:endParaRPr lang="en-US" dirty="0"/>
           </a:p>
@@ -5385,7 +5387,7 @@
           <a:p>
             <a:fld id="{AF6E2C9B-5FA2-460D-9BE7-B0812FC2A6FF}" type="datetimeFigureOut">
               <a:rPr lang="en-US" dirty="0"/>
-              <a:t>4/8/2019</a:t>
+              <a:t>4/9/2019</a:t>
             </a:fld>
             <a:endParaRPr lang="en-US" dirty="0"/>
           </a:p>
@@ -5685,7 +5687,7 @@
             <a:fld id="{5586B75A-687E-405C-8A0B-8D00578BA2C3}" type="datetimeFigureOut">
               <a:rPr lang="en-US" dirty="0"/>
               <a:pPr/>
-              <a:t>4/8/2019</a:t>
+              <a:t>4/9/2019</a:t>
             </a:fld>
             <a:endParaRPr lang="en-US" dirty="0"/>
           </a:p>
@@ -5895,7 +5897,7 @@
             <a:fld id="{5586B75A-687E-405C-8A0B-8D00578BA2C3}" type="datetimeFigureOut">
               <a:rPr lang="en-US" dirty="0"/>
               <a:pPr/>
-              <a:t>4/8/2019</a:t>
+              <a:t>4/9/2019</a:t>
             </a:fld>
             <a:endParaRPr lang="en-US" dirty="0"/>
           </a:p>
@@ -6479,7 +6481,7 @@
           <a:p>
             <a:fld id="{21DE34AB-78EC-4614-BD69-68CDC1B22548}" type="datetimeFigureOut">
               <a:rPr lang="en-US" smtClean="0"/>
-              <a:t>4/8/2019</a:t>
+              <a:t>4/9/2019</a:t>
             </a:fld>
             <a:endParaRPr lang="en-US"/>
           </a:p>
@@ -6924,7 +6926,7 @@
           <a:p>
             <a:r>
               <a:rPr lang="en-US" sz="7200" dirty="0"/>
-              <a:t>US Home Rental Analysis</a:t>
+              <a:t>US Rental Price Analysis</a:t>
             </a:r>
           </a:p>
         </p:txBody>
@@ -7024,7 +7026,7 @@
         </p:nvSpPr>
         <p:spPr>
           <a:xfrm>
-            <a:off x="738236" y="390834"/>
+            <a:off x="738235" y="5805390"/>
             <a:ext cx="10715525" cy="596694"/>
           </a:xfrm>
         </p:spPr>
@@ -7034,10 +7036,17 @@
           <a:p>
             <a:pPr algn="ctr"/>
             <a:r>
-              <a:rPr lang="en-US" sz="2800" dirty="0"/>
-              <a:t>And what about Southern California?</a:t>
-            </a:r>
-            <a:endParaRPr lang="en-US" sz="2800" dirty="0">
+              <a:rPr lang="en-US" sz="2000" dirty="0"/>
+              <a:t>Average annual rent increase:  3.9%</a:t>
+            </a:r>
+            <a:br>
+              <a:rPr lang="en-US" sz="2000" dirty="0"/>
+            </a:br>
+            <a:r>
+              <a:rPr lang="en-US" sz="2000" dirty="0"/>
+              <a:t>($1700 per month)</a:t>
+            </a:r>
+            <a:endParaRPr lang="en-US" sz="2000" dirty="0">
               <a:solidFill>
                 <a:srgbClr val="FFFF00"/>
               </a:solidFill>
@@ -7047,10 +7056,10 @@
       </p:sp>
       <p:sp>
         <p:nvSpPr>
-          <p:cNvPr id="5" name="Title 1">
-            <a:extLst>
-              <a:ext uri="{FF2B5EF4-FFF2-40B4-BE49-F238E27FC236}">
-                <a16:creationId xmlns:a16="http://schemas.microsoft.com/office/drawing/2014/main" id="{5233210E-EB53-4133-A3BC-BB76AB45C68E}"/>
+          <p:cNvPr id="4" name="Title 1">
+            <a:extLst>
+              <a:ext uri="{FF2B5EF4-FFF2-40B4-BE49-F238E27FC236}">
+                <a16:creationId xmlns:a16="http://schemas.microsoft.com/office/drawing/2014/main" id="{D384CF35-B8B9-41CF-8D5D-528DAF4955B3}"/>
               </a:ext>
             </a:extLst>
           </p:cNvPr>
@@ -7061,7 +7070,7 @@
         </p:nvSpPr>
         <p:spPr>
           <a:xfrm>
-            <a:off x="738235" y="5768068"/>
+            <a:off x="738236" y="537692"/>
             <a:ext cx="10715525" cy="596694"/>
           </a:xfrm>
           <a:prstGeom prst="rect">
@@ -7094,25 +7103,23 @@
           <a:p>
             <a:pPr algn="ctr"/>
             <a:r>
-              <a:rPr lang="en-US" sz="2000" dirty="0"/>
-              <a:t>Average annual rent increase:  4.3% (2.6% more than the national average).</a:t>
-            </a:r>
-            <a:br>
-              <a:rPr lang="en-US" sz="2000" dirty="0"/>
-            </a:br>
-            <a:r>
-              <a:rPr lang="en-US" sz="2000" dirty="0"/>
-              <a:t>Newport Beach, Santa Monica &amp; Beverly Hills are all (literally) off the chart.</a:t>
-            </a:r>
+              <a:rPr lang="en-US" sz="2800" dirty="0"/>
+              <a:t>How do the 20 most populous cities in the US stack up against the average nationwide?</a:t>
+            </a:r>
+            <a:endParaRPr lang="en-US" sz="2800" dirty="0">
+              <a:solidFill>
+                <a:srgbClr val="FFFF00"/>
+              </a:solidFill>
+            </a:endParaRPr>
           </a:p>
         </p:txBody>
       </p:sp>
       <p:pic>
         <p:nvPicPr>
-          <p:cNvPr id="4" name="Picture 3">
-            <a:extLst>
-              <a:ext uri="{FF2B5EF4-FFF2-40B4-BE49-F238E27FC236}">
-                <a16:creationId xmlns:a16="http://schemas.microsoft.com/office/drawing/2014/main" id="{97A01BE4-A873-4A1A-89C0-7F729DD5B522}"/>
+          <p:cNvPr id="5" name="Picture 4">
+            <a:extLst>
+              <a:ext uri="{FF2B5EF4-FFF2-40B4-BE49-F238E27FC236}">
+                <a16:creationId xmlns:a16="http://schemas.microsoft.com/office/drawing/2014/main" id="{5CE22345-9933-4C16-8BF3-BC7195F8DC87}"/>
               </a:ext>
             </a:extLst>
           </p:cNvPr>
@@ -7140,7 +7147,7 @@
     </p:spTree>
     <p:extLst>
       <p:ext uri="{BB962C8B-B14F-4D97-AF65-F5344CB8AC3E}">
-        <p14:creationId xmlns:p14="http://schemas.microsoft.com/office/powerpoint/2010/main" val="2350117493"/>
+        <p14:creationId xmlns:p14="http://schemas.microsoft.com/office/powerpoint/2010/main" val="1726307669"/>
       </p:ext>
     </p:extLst>
   </p:cSld>
@@ -7185,6 +7192,178 @@
         </p:nvSpPr>
         <p:spPr>
           <a:xfrm>
+            <a:off x="738235" y="353278"/>
+            <a:ext cx="10715525" cy="596694"/>
+          </a:xfrm>
+        </p:spPr>
+        <p:txBody>
+          <a:bodyPr/>
+          <a:lstStyle/>
+          <a:p>
+            <a:pPr algn="ctr"/>
+            <a:r>
+              <a:rPr lang="en-US" sz="2800" dirty="0"/>
+              <a:t>And what about Orange County?</a:t>
+            </a:r>
+            <a:endParaRPr lang="en-US" sz="2800" dirty="0">
+              <a:solidFill>
+                <a:srgbClr val="FFFF00"/>
+              </a:solidFill>
+            </a:endParaRPr>
+          </a:p>
+        </p:txBody>
+      </p:sp>
+      <p:sp>
+        <p:nvSpPr>
+          <p:cNvPr id="5" name="Title 1">
+            <a:extLst>
+              <a:ext uri="{FF2B5EF4-FFF2-40B4-BE49-F238E27FC236}">
+                <a16:creationId xmlns:a16="http://schemas.microsoft.com/office/drawing/2014/main" id="{5233210E-EB53-4133-A3BC-BB76AB45C68E}"/>
+              </a:ext>
+            </a:extLst>
+          </p:cNvPr>
+          <p:cNvSpPr txBox="1">
+            <a:spLocks/>
+          </p:cNvSpPr>
+          <p:nvPr/>
+        </p:nvSpPr>
+        <p:spPr>
+          <a:xfrm>
+            <a:off x="738235" y="5945117"/>
+            <a:ext cx="10715525" cy="596694"/>
+          </a:xfrm>
+          <a:prstGeom prst="rect">
+            <a:avLst/>
+          </a:prstGeom>
+        </p:spPr>
+        <p:txBody>
+          <a:bodyPr vert="horz" lIns="91440" tIns="45720" rIns="91440" bIns="45720" rtlCol="0" anchor="b">
+            <a:noAutofit/>
+          </a:bodyPr>
+          <a:lstStyle>
+            <a:lvl1pPr algn="l" defTabSz="914400" rtl="0" eaLnBrk="1" latinLnBrk="0" hangingPunct="1">
+              <a:lnSpc>
+                <a:spcPct val="80000"/>
+              </a:lnSpc>
+              <a:spcBef>
+                <a:spcPct val="0"/>
+              </a:spcBef>
+              <a:buNone/>
+              <a:defRPr sz="8800" kern="1200" spc="-120" baseline="0">
+                <a:solidFill>
+                  <a:schemeClr val="tx1"/>
+                </a:solidFill>
+                <a:latin typeface="+mj-lt"/>
+                <a:ea typeface="+mj-ea"/>
+                <a:cs typeface="+mj-cs"/>
+              </a:defRPr>
+            </a:lvl1pPr>
+          </a:lstStyle>
+          <a:p>
+            <a:pPr algn="ctr"/>
+            <a:r>
+              <a:rPr lang="en-US" sz="1600" dirty="0"/>
+              <a:t>Average annual rent increase:  4.3% (versus the 1.7% national average).</a:t>
+            </a:r>
+          </a:p>
+          <a:p>
+            <a:pPr algn="ctr"/>
+            <a:endParaRPr lang="en-US" sz="1600" dirty="0"/>
+          </a:p>
+          <a:p>
+            <a:pPr algn="ctr"/>
+            <a:r>
+              <a:rPr lang="en-US" sz="1600" dirty="0"/>
+              <a:t>Newport Beach topped the list of OC cities to rent in at $5174 per month, with Laguna Beach ($5120) and Villa Park ($4853) close behind.</a:t>
+            </a:r>
+          </a:p>
+          <a:p>
+            <a:pPr algn="ctr"/>
+            <a:r>
+              <a:rPr lang="en-US" sz="1600" dirty="0"/>
+              <a:t> Laguna Woods was the least expensive &amp; closest to the national average at $2081 per month.</a:t>
+            </a:r>
+          </a:p>
+        </p:txBody>
+      </p:sp>
+      <p:pic>
+        <p:nvPicPr>
+          <p:cNvPr id="4" name="Picture 3">
+            <a:extLst>
+              <a:ext uri="{FF2B5EF4-FFF2-40B4-BE49-F238E27FC236}">
+                <a16:creationId xmlns:a16="http://schemas.microsoft.com/office/drawing/2014/main" id="{97A01BE4-A873-4A1A-89C0-7F729DD5B522}"/>
+              </a:ext>
+            </a:extLst>
+          </p:cNvPr>
+          <p:cNvPicPr>
+            <a:picLocks noChangeAspect="1"/>
+          </p:cNvPicPr>
+          <p:nvPr/>
+        </p:nvPicPr>
+        <p:blipFill>
+          <a:blip r:embed="rId2"/>
+          <a:stretch>
+            <a:fillRect/>
+          </a:stretch>
+        </p:blipFill>
+        <p:spPr>
+          <a:xfrm>
+            <a:off x="2762247" y="1155246"/>
+            <a:ext cx="6667500" cy="4286250"/>
+          </a:xfrm>
+          <a:prstGeom prst="rect">
+            <a:avLst/>
+          </a:prstGeom>
+        </p:spPr>
+      </p:pic>
+    </p:spTree>
+    <p:extLst>
+      <p:ext uri="{BB962C8B-B14F-4D97-AF65-F5344CB8AC3E}">
+        <p14:creationId xmlns:p14="http://schemas.microsoft.com/office/powerpoint/2010/main" val="2350117493"/>
+      </p:ext>
+    </p:extLst>
+  </p:cSld>
+  <p:clrMapOvr>
+    <a:masterClrMapping/>
+  </p:clrMapOvr>
+</p:sld>
+</file>
+
+<file path=ppt/slides/slide12.xml><?xml version="1.0" encoding="utf-8"?>
+<p:sld xmlns:a="http://schemas.openxmlformats.org/drawingml/2006/main" xmlns:r="http://schemas.openxmlformats.org/officeDocument/2006/relationships" xmlns:p="http://schemas.openxmlformats.org/presentationml/2006/main">
+  <p:cSld>
+    <p:spTree>
+      <p:nvGrpSpPr>
+        <p:cNvPr id="1" name=""/>
+        <p:cNvGrpSpPr/>
+        <p:nvPr/>
+      </p:nvGrpSpPr>
+      <p:grpSpPr>
+        <a:xfrm>
+          <a:off x="0" y="0"/>
+          <a:ext cx="0" cy="0"/>
+          <a:chOff x="0" y="0"/>
+          <a:chExt cx="0" cy="0"/>
+        </a:xfrm>
+      </p:grpSpPr>
+      <p:sp>
+        <p:nvSpPr>
+          <p:cNvPr id="2" name="Title 1">
+            <a:extLst>
+              <a:ext uri="{FF2B5EF4-FFF2-40B4-BE49-F238E27FC236}">
+                <a16:creationId xmlns:a16="http://schemas.microsoft.com/office/drawing/2014/main" id="{D2B2D5AA-1A0B-485A-B6FC-427A891DA11C}"/>
+              </a:ext>
+            </a:extLst>
+          </p:cNvPr>
+          <p:cNvSpPr>
+            <a:spLocks noGrp="1"/>
+          </p:cNvSpPr>
+          <p:nvPr>
+            <p:ph type="ctrTitle"/>
+          </p:nvPr>
+        </p:nvSpPr>
+        <p:spPr>
+          <a:xfrm>
             <a:off x="738237" y="1015765"/>
             <a:ext cx="10715525" cy="596694"/>
           </a:xfrm>
@@ -7269,14 +7448,7 @@
             </a:br>
             <a:r>
               <a:rPr lang="en-US" sz="2000" dirty="0"/>
-              <a:t>Really expensive.</a:t>
-            </a:r>
-            <a:br>
-              <a:rPr lang="en-US" sz="2000" dirty="0"/>
-            </a:br>
-            <a:r>
-              <a:rPr lang="en-US" sz="2000" dirty="0"/>
-              <a:t>San Francisco reigns supreme as the most expensive “big” city in the country to call home.</a:t>
+              <a:t>Of the 20 most populous cities, San Francisco was the only one to break the $4,000 per month mark.  San Jose was the only other city averaging over $3,000 per month in this group.</a:t>
             </a:r>
             <a:br>
               <a:rPr lang="en-US" sz="2800" dirty="0"/>
@@ -7328,7 +7500,7 @@
 </p:sld>
 </file>
 
-<file path=ppt/slides/slide12.xml><?xml version="1.0" encoding="utf-8"?>
+<file path=ppt/slides/slide13.xml><?xml version="1.0" encoding="utf-8"?>
 <p:sld xmlns:a="http://schemas.openxmlformats.org/drawingml/2006/main" xmlns:r="http://schemas.openxmlformats.org/officeDocument/2006/relationships" xmlns:p="http://schemas.openxmlformats.org/presentationml/2006/main">
   <p:cSld>
     <p:spTree>
@@ -7399,7 +7571,7 @@
         </p:nvSpPr>
         <p:spPr>
           <a:xfrm>
-            <a:off x="728905" y="5915840"/>
+            <a:off x="738235" y="5813204"/>
             <a:ext cx="10715525" cy="596694"/>
           </a:xfrm>
           <a:prstGeom prst="rect">
@@ -7438,14 +7610,20 @@
                 </a:solidFill>
               </a:rPr>
             </a:br>
-            <a:r>
+            <a:br>
               <a:rPr lang="en-US" sz="2000" dirty="0"/>
-              <a:t>Portland, Austin and Denver are the winners here.</a:t>
+            </a:br>
+            <a:r>
+              <a:rPr lang="en-US" sz="2000" dirty="0"/>
+              <a:t>Denver job growth peaked at 4.3% during this time period, roughly double the national average of 2%.</a:t>
             </a:r>
             <a:br>
-              <a:rPr lang="en-US" sz="2800" dirty="0"/>
+              <a:rPr lang="en-US" sz="2000" dirty="0"/>
             </a:br>
-            <a:endParaRPr lang="en-US" sz="2800" dirty="0"/>
+            <a:r>
+              <a:rPr lang="en-US" sz="1400" dirty="0"/>
+              <a:t>(sources: US Census Data, Forbes)</a:t>
+            </a:r>
           </a:p>
         </p:txBody>
       </p:sp>
@@ -7492,7 +7670,7 @@
 </p:sld>
 </file>
 
-<file path=ppt/slides/slide13.xml><?xml version="1.0" encoding="utf-8"?>
+<file path=ppt/slides/slide14.xml><?xml version="1.0" encoding="utf-8"?>
 <p:sld xmlns:a="http://schemas.openxmlformats.org/drawingml/2006/main" xmlns:r="http://schemas.openxmlformats.org/officeDocument/2006/relationships" xmlns:p="http://schemas.openxmlformats.org/presentationml/2006/main">
   <p:cSld>
     <p:spTree>
@@ -7563,7 +7741,7 @@
         </p:nvSpPr>
         <p:spPr>
           <a:xfrm>
-            <a:off x="728905" y="5915840"/>
+            <a:off x="738235" y="6261306"/>
             <a:ext cx="10715525" cy="596694"/>
           </a:xfrm>
           <a:prstGeom prst="rect">
@@ -7604,7 +7782,22 @@
             </a:br>
             <a:r>
               <a:rPr lang="en-US" sz="2000" dirty="0"/>
-              <a:t>Look out Houston, Dallas, and Charlotte.  It’s starting to get a little pricey around there.</a:t>
+              <a:t>For the period surveyed, Houston (the 4</a:t>
+            </a:r>
+            <a:r>
+              <a:rPr lang="en-US" sz="2000" baseline="30000" dirty="0"/>
+              <a:t>th</a:t>
+            </a:r>
+            <a:r>
+              <a:rPr lang="en-US" sz="2000" dirty="0"/>
+              <a:t> largest city in the country) had one of the highest rental vacancy rates in the country (7.1%)  for a city of its size. </a:t>
+            </a:r>
+            <a:br>
+              <a:rPr lang="en-US" sz="2000" dirty="0"/>
+            </a:br>
+            <a:r>
+              <a:rPr lang="en-US" sz="1600" dirty="0"/>
+              <a:t>(source: www.chron.com)</a:t>
             </a:r>
             <a:br>
               <a:rPr lang="en-US" sz="2800" dirty="0"/>
@@ -7635,7 +7828,7 @@
         </p:blipFill>
         <p:spPr>
           <a:xfrm>
-            <a:off x="2762250" y="1285875"/>
+            <a:off x="2762248" y="1285875"/>
             <a:ext cx="6667500" cy="4286250"/>
           </a:xfrm>
           <a:prstGeom prst="rect">
@@ -7656,7 +7849,7 @@
 </p:sld>
 </file>
 
-<file path=ppt/slides/slide14.xml><?xml version="1.0" encoding="utf-8"?>
+<file path=ppt/slides/slide15.xml><?xml version="1.0" encoding="utf-8"?>
 <p:sld xmlns:a="http://schemas.openxmlformats.org/drawingml/2006/main" xmlns:r="http://schemas.openxmlformats.org/officeDocument/2006/relationships" xmlns:p="http://schemas.openxmlformats.org/presentationml/2006/main">
   <p:cSld>
     <p:spTree>
@@ -7727,7 +7920,7 @@
         </p:nvSpPr>
         <p:spPr>
           <a:xfrm>
-            <a:off x="738235" y="6130444"/>
+            <a:off x="738235" y="6027807"/>
             <a:ext cx="10715525" cy="596694"/>
           </a:xfrm>
           <a:prstGeom prst="rect">
@@ -7767,28 +7960,28 @@
               </a:rPr>
             </a:br>
             <a:r>
-              <a:rPr lang="en-US" sz="2000" dirty="0"/>
-              <a:t>Of the top 20 largest cities in the U.S., Detroit and Memphis are the only ones to have gone down.</a:t>
+              <a:rPr lang="en-US" sz="1800" dirty="0"/>
+              <a:t>Of the 20 largest cities in the U.S., Detroit and Memphis are the only ones to have gone down (albeit only slightly for Memphis).</a:t>
             </a:r>
             <a:br>
-              <a:rPr lang="en-US" sz="2000" dirty="0"/>
+              <a:rPr lang="en-US" sz="1800" dirty="0"/>
             </a:br>
             <a:r>
-              <a:rPr lang="en-US" sz="2000" dirty="0"/>
+              <a:rPr lang="en-US" sz="1800" dirty="0"/>
               <a:t>Despite being the 17</a:t>
             </a:r>
             <a:r>
-              <a:rPr lang="en-US" sz="2000" baseline="30000" dirty="0"/>
+              <a:rPr lang="en-US" sz="1800" baseline="30000" dirty="0"/>
               <a:t>th</a:t>
             </a:r>
             <a:r>
-              <a:rPr lang="en-US" sz="2000" dirty="0"/>
-              <a:t> largest city, Detroit is the least expensive to live in of the top 100.</a:t>
+              <a:rPr lang="en-US" sz="1800" dirty="0"/>
+              <a:t> largest city, Detroit is the least expensive to live in of the top 100 ($750 per month).</a:t>
             </a:r>
             <a:br>
-              <a:rPr lang="en-US" sz="2800" dirty="0"/>
+              <a:rPr lang="en-US" sz="1800" dirty="0"/>
             </a:br>
-            <a:endParaRPr lang="en-US" sz="2800" dirty="0"/>
+            <a:endParaRPr lang="en-US" sz="1800" dirty="0"/>
           </a:p>
         </p:txBody>
       </p:sp>
@@ -7835,7 +8028,7 @@
 </p:sld>
 </file>
 
-<file path=ppt/slides/slide15.xml><?xml version="1.0" encoding="utf-8"?>
+<file path=ppt/slides/slide16.xml><?xml version="1.0" encoding="utf-8"?>
 <p:sld xmlns:a="http://schemas.openxmlformats.org/drawingml/2006/main" xmlns:r="http://schemas.openxmlformats.org/officeDocument/2006/relationships" xmlns:p="http://schemas.openxmlformats.org/presentationml/2006/main">
   <p:cSld>
     <p:spTree>
@@ -7906,7 +8099,7 @@
         </p:nvSpPr>
         <p:spPr>
           <a:xfrm>
-            <a:off x="738233" y="5981154"/>
+            <a:off x="738232" y="6261306"/>
             <a:ext cx="10715525" cy="596694"/>
           </a:xfrm>
           <a:prstGeom prst="rect">
@@ -7954,7 +8147,18 @@
             </a:br>
             <a:r>
               <a:rPr lang="en-US" sz="2000" dirty="0"/>
-              <a:t>If you’re currently renting in any one of these, you’re paying.  A lot.</a:t>
+              <a:t>If you’re currently renting in any one of these, you’re paying for it.</a:t>
+            </a:r>
+            <a:br>
+              <a:rPr lang="en-US" sz="2000" dirty="0"/>
+            </a:br>
+            <a:endParaRPr lang="en-US" sz="2000" dirty="0"/>
+          </a:p>
+          <a:p>
+            <a:pPr algn="ctr"/>
+            <a:r>
+              <a:rPr lang="en-US" sz="2000" dirty="0"/>
+              <a:t>There were 13 cities total that topped $10k per month; 8 are in California.</a:t>
             </a:r>
             <a:br>
               <a:rPr lang="en-US" sz="2800" dirty="0"/>
@@ -8006,7 +8210,7 @@
 </p:sld>
 </file>
 
-<file path=ppt/slides/slide16.xml><?xml version="1.0" encoding="utf-8"?>
+<file path=ppt/slides/slide17.xml><?xml version="1.0" encoding="utf-8"?>
 <p:sld xmlns:a="http://schemas.openxmlformats.org/drawingml/2006/main" xmlns:r="http://schemas.openxmlformats.org/officeDocument/2006/relationships" xmlns:p="http://schemas.openxmlformats.org/presentationml/2006/main">
   <p:cSld>
     <p:spTree>
@@ -8117,23 +8321,30 @@
               </a:rPr>
             </a:br>
             <a:r>
-              <a:rPr lang="en-US" sz="2000" dirty="0"/>
-              <a:t>Atherton, CA (pop. 7,156) is the most expensive ZIP code in the United States (1029% over the national average).</a:t>
+              <a:rPr lang="en-US" sz="1800" dirty="0"/>
+              <a:t>Atherton, CA (pop. 7,156 and home to many Silicon Valley CEOs) is the most expensive ZIP code in the United States</a:t>
             </a:r>
             <a:br>
-              <a:rPr lang="en-US" sz="2000" dirty="0"/>
+              <a:rPr lang="en-US" sz="1800" dirty="0"/>
+            </a:br>
+            <a:r>
+              <a:rPr lang="en-US" sz="1800" dirty="0"/>
+              <a:t>(1029% over the national average).</a:t>
+            </a:r>
+            <a:br>
+              <a:rPr lang="en-US" sz="1800" dirty="0"/>
             </a:br>
             <a:br>
-              <a:rPr lang="en-US" sz="2000" dirty="0"/>
+              <a:rPr lang="en-US" sz="1800" dirty="0"/>
             </a:br>
             <a:r>
-              <a:rPr lang="en-US" sz="2000" dirty="0"/>
+              <a:rPr lang="en-US" sz="1800" dirty="0"/>
               <a:t>At $549 a month, Flint, MI is currently the least expensive American city to rent in (62% less than the national average).</a:t>
             </a:r>
             <a:br>
-              <a:rPr lang="en-US" sz="2800" dirty="0"/>
+              <a:rPr lang="en-US" sz="1800" dirty="0"/>
             </a:br>
-            <a:endParaRPr lang="en-US" sz="2800" dirty="0"/>
+            <a:endParaRPr lang="en-US" sz="1800" dirty="0"/>
           </a:p>
         </p:txBody>
       </p:sp>
@@ -8180,7 +8391,7 @@
 </p:sld>
 </file>
 
-<file path=ppt/slides/slide17.xml><?xml version="1.0" encoding="utf-8"?>
+<file path=ppt/slides/slide18.xml><?xml version="1.0" encoding="utf-8"?>
 <p:sld xmlns:a="http://schemas.openxmlformats.org/drawingml/2006/main" xmlns:r="http://schemas.openxmlformats.org/officeDocument/2006/relationships" xmlns:p="http://schemas.openxmlformats.org/presentationml/2006/main">
   <p:cSld>
     <p:spTree>
@@ -8230,7 +8441,7 @@
                   <a:srgbClr val="FFFF00"/>
                 </a:solidFill>
               </a:rPr>
-              <a:t>So…. why, exactly have prices gone up?</a:t>
+              <a:t>So…. why exactly have prices gone up?</a:t>
             </a:r>
             <a:br>
               <a:rPr lang="en-US" sz="2800" dirty="0"/>
@@ -8348,7 +8559,7 @@
 </p:sld>
 </file>
 
-<file path=ppt/slides/slide18.xml><?xml version="1.0" encoding="utf-8"?>
+<file path=ppt/slides/slide19.xml><?xml version="1.0" encoding="utf-8"?>
 <p:sld xmlns:a="http://schemas.openxmlformats.org/drawingml/2006/main" xmlns:r="http://schemas.openxmlformats.org/officeDocument/2006/relationships" xmlns:p="http://schemas.openxmlformats.org/presentationml/2006/main">
   <p:cSld>
     <p:spTree>
@@ -8512,7 +8723,175 @@
 </p:sld>
 </file>
 
-<file path=ppt/slides/slide19.xml><?xml version="1.0" encoding="utf-8"?>
+<file path=ppt/slides/slide2.xml><?xml version="1.0" encoding="utf-8"?>
+<p:sld xmlns:a="http://schemas.openxmlformats.org/drawingml/2006/main" xmlns:r="http://schemas.openxmlformats.org/officeDocument/2006/relationships" xmlns:p="http://schemas.openxmlformats.org/presentationml/2006/main">
+  <p:cSld>
+    <p:spTree>
+      <p:nvGrpSpPr>
+        <p:cNvPr id="1" name=""/>
+        <p:cNvGrpSpPr/>
+        <p:nvPr/>
+      </p:nvGrpSpPr>
+      <p:grpSpPr>
+        <a:xfrm>
+          <a:off x="0" y="0"/>
+          <a:ext cx="0" cy="0"/>
+          <a:chOff x="0" y="0"/>
+          <a:chExt cx="0" cy="0"/>
+        </a:xfrm>
+      </p:grpSpPr>
+      <p:sp>
+        <p:nvSpPr>
+          <p:cNvPr id="2" name="Title 1">
+            <a:extLst>
+              <a:ext uri="{FF2B5EF4-FFF2-40B4-BE49-F238E27FC236}">
+                <a16:creationId xmlns:a16="http://schemas.microsoft.com/office/drawing/2014/main" id="{D2B2D5AA-1A0B-485A-B6FC-427A891DA11C}"/>
+              </a:ext>
+            </a:extLst>
+          </p:cNvPr>
+          <p:cNvSpPr>
+            <a:spLocks noGrp="1"/>
+          </p:cNvSpPr>
+          <p:nvPr>
+            <p:ph type="ctrTitle"/>
+          </p:nvPr>
+        </p:nvSpPr>
+        <p:spPr>
+          <a:xfrm>
+            <a:off x="603504" y="770467"/>
+            <a:ext cx="10782300" cy="4671545"/>
+          </a:xfrm>
+        </p:spPr>
+        <p:txBody>
+          <a:bodyPr/>
+          <a:lstStyle/>
+          <a:p>
+            <a:pPr algn="ctr"/>
+            <a:r>
+              <a:rPr lang="en-US" sz="2800" dirty="0"/>
+              <a:t>Our project began with a simple observation:</a:t>
+            </a:r>
+            <a:br>
+              <a:rPr lang="en-US" sz="2800" dirty="0"/>
+            </a:br>
+            <a:br>
+              <a:rPr lang="en-US" sz="2800" dirty="0"/>
+            </a:br>
+            <a:r>
+              <a:rPr lang="en-US" sz="4000" dirty="0">
+                <a:solidFill>
+                  <a:srgbClr val="FFFF00"/>
+                </a:solidFill>
+              </a:rPr>
+              <a:t>“Why are rent prices so high these days?”</a:t>
+            </a:r>
+            <a:br>
+              <a:rPr lang="en-US" sz="2800" dirty="0"/>
+            </a:br>
+            <a:br>
+              <a:rPr lang="en-US" sz="2800" dirty="0"/>
+            </a:br>
+            <a:br>
+              <a:rPr lang="en-US" sz="2800" dirty="0"/>
+            </a:br>
+            <a:r>
+              <a:rPr lang="en-US" sz="2800" dirty="0"/>
+              <a:t>To delve into this, we utilized the following sources:</a:t>
+            </a:r>
+            <a:br>
+              <a:rPr lang="en-US" sz="2800" dirty="0"/>
+            </a:br>
+            <a:br>
+              <a:rPr lang="en-US" sz="2800" dirty="0"/>
+            </a:br>
+            <a:br>
+              <a:rPr lang="en-US" sz="2000" dirty="0"/>
+            </a:br>
+            <a:r>
+              <a:rPr lang="en-US" sz="2000" dirty="0">
+                <a:solidFill>
+                  <a:srgbClr val="FFFF00"/>
+                </a:solidFill>
+              </a:rPr>
+              <a:t>Kaggle – average rental pricing info for roughly 17,000 American cities</a:t>
+            </a:r>
+            <a:br>
+              <a:rPr lang="en-US" sz="2000" dirty="0">
+                <a:solidFill>
+                  <a:srgbClr val="FFFF00"/>
+                </a:solidFill>
+              </a:rPr>
+            </a:br>
+            <a:r>
+              <a:rPr lang="en-US" sz="2000" dirty="0">
+                <a:solidFill>
+                  <a:srgbClr val="FFFF00"/>
+                </a:solidFill>
+              </a:rPr>
+              <a:t>Zillow – used as a backup reference to Kaggle for specific data points</a:t>
+            </a:r>
+            <a:br>
+              <a:rPr lang="en-US" sz="2000" dirty="0">
+                <a:solidFill>
+                  <a:srgbClr val="FFFF00"/>
+                </a:solidFill>
+              </a:rPr>
+            </a:br>
+            <a:r>
+              <a:rPr lang="en-US" sz="2000" dirty="0">
+                <a:solidFill>
+                  <a:srgbClr val="FFFF00"/>
+                </a:solidFill>
+              </a:rPr>
+              <a:t>US Census Bureau - population statistics, rental vacancy &amp; homeownership data</a:t>
+            </a:r>
+            <a:br>
+              <a:rPr lang="en-US" sz="2000" dirty="0">
+                <a:solidFill>
+                  <a:srgbClr val="FFFF00"/>
+                </a:solidFill>
+              </a:rPr>
+            </a:br>
+            <a:r>
+              <a:rPr lang="en-US" sz="2000" dirty="0">
+                <a:solidFill>
+                  <a:srgbClr val="FFFF00"/>
+                </a:solidFill>
+              </a:rPr>
+              <a:t>Google Maps API – map building and location referencing</a:t>
+            </a:r>
+            <a:br>
+              <a:rPr lang="en-US" sz="2000" dirty="0">
+                <a:solidFill>
+                  <a:srgbClr val="FFFF00"/>
+                </a:solidFill>
+              </a:rPr>
+            </a:br>
+            <a:r>
+              <a:rPr lang="en-US" sz="2000" dirty="0">
+                <a:solidFill>
+                  <a:srgbClr val="FFFF00"/>
+                </a:solidFill>
+              </a:rPr>
+              <a:t>Other various sources cited accordingly throughout this presentation</a:t>
+            </a:r>
+          </a:p>
+        </p:txBody>
+      </p:sp>
+    </p:spTree>
+    <p:extLst>
+      <p:ext uri="{BB962C8B-B14F-4D97-AF65-F5344CB8AC3E}">
+        <p14:creationId xmlns:p14="http://schemas.microsoft.com/office/powerpoint/2010/main" val="2582390284"/>
+      </p:ext>
+    </p:extLst>
+  </p:cSld>
+  <p:clrMapOvr>
+    <a:masterClrMapping/>
+  </p:clrMapOvr>
+</p:sld>
+</file>
+
+<file path=ppt/slides/slide20.xml><?xml version="1.0" encoding="utf-8"?>
 <p:sld xmlns:a="http://schemas.openxmlformats.org/drawingml/2006/main" xmlns:r="http://schemas.openxmlformats.org/officeDocument/2006/relationships" xmlns:p="http://schemas.openxmlformats.org/presentationml/2006/main">
   <p:cSld>
     <p:spTree>
@@ -8676,145 +9055,7 @@
 </p:sld>
 </file>
 
-<file path=ppt/slides/slide2.xml><?xml version="1.0" encoding="utf-8"?>
-<p:sld xmlns:a="http://schemas.openxmlformats.org/drawingml/2006/main" xmlns:r="http://schemas.openxmlformats.org/officeDocument/2006/relationships" xmlns:p="http://schemas.openxmlformats.org/presentationml/2006/main">
-  <p:cSld>
-    <p:spTree>
-      <p:nvGrpSpPr>
-        <p:cNvPr id="1" name=""/>
-        <p:cNvGrpSpPr/>
-        <p:nvPr/>
-      </p:nvGrpSpPr>
-      <p:grpSpPr>
-        <a:xfrm>
-          <a:off x="0" y="0"/>
-          <a:ext cx="0" cy="0"/>
-          <a:chOff x="0" y="0"/>
-          <a:chExt cx="0" cy="0"/>
-        </a:xfrm>
-      </p:grpSpPr>
-      <p:sp>
-        <p:nvSpPr>
-          <p:cNvPr id="2" name="Title 1">
-            <a:extLst>
-              <a:ext uri="{FF2B5EF4-FFF2-40B4-BE49-F238E27FC236}">
-                <a16:creationId xmlns:a16="http://schemas.microsoft.com/office/drawing/2014/main" id="{D2B2D5AA-1A0B-485A-B6FC-427A891DA11C}"/>
-              </a:ext>
-            </a:extLst>
-          </p:cNvPr>
-          <p:cNvSpPr>
-            <a:spLocks noGrp="1"/>
-          </p:cNvSpPr>
-          <p:nvPr>
-            <p:ph type="ctrTitle"/>
-          </p:nvPr>
-        </p:nvSpPr>
-        <p:spPr>
-          <a:xfrm>
-            <a:off x="603504" y="770467"/>
-            <a:ext cx="10782300" cy="4671545"/>
-          </a:xfrm>
-        </p:spPr>
-        <p:txBody>
-          <a:bodyPr/>
-          <a:lstStyle/>
-          <a:p>
-            <a:pPr algn="ctr"/>
-            <a:r>
-              <a:rPr lang="en-US" sz="2800" dirty="0"/>
-              <a:t>Our project began with a simple observation:</a:t>
-            </a:r>
-            <a:br>
-              <a:rPr lang="en-US" sz="2800" dirty="0"/>
-            </a:br>
-            <a:br>
-              <a:rPr lang="en-US" sz="2800" dirty="0"/>
-            </a:br>
-            <a:r>
-              <a:rPr lang="en-US" sz="4000" dirty="0">
-                <a:solidFill>
-                  <a:srgbClr val="FFFF00"/>
-                </a:solidFill>
-              </a:rPr>
-              <a:t>“Home rental prices are really high these days. Why?”</a:t>
-            </a:r>
-            <a:br>
-              <a:rPr lang="en-US" sz="2800" dirty="0"/>
-            </a:br>
-            <a:br>
-              <a:rPr lang="en-US" sz="2800" dirty="0"/>
-            </a:br>
-            <a:br>
-              <a:rPr lang="en-US" sz="2800" dirty="0"/>
-            </a:br>
-            <a:r>
-              <a:rPr lang="en-US" sz="2800" dirty="0"/>
-              <a:t>To delve into this, we utilized the following sources:</a:t>
-            </a:r>
-            <a:br>
-              <a:rPr lang="en-US" sz="2800" dirty="0"/>
-            </a:br>
-            <a:br>
-              <a:rPr lang="en-US" sz="2800" dirty="0"/>
-            </a:br>
-            <a:br>
-              <a:rPr lang="en-US" sz="2800" dirty="0"/>
-            </a:br>
-            <a:r>
-              <a:rPr lang="en-US" sz="2800" dirty="0">
-                <a:solidFill>
-                  <a:srgbClr val="FFFF00"/>
-                </a:solidFill>
-              </a:rPr>
-              <a:t>Kaggle (rental info for 17,000 American cities)</a:t>
-            </a:r>
-            <a:br>
-              <a:rPr lang="en-US" sz="2800" dirty="0">
-                <a:solidFill>
-                  <a:srgbClr val="FFFF00"/>
-                </a:solidFill>
-              </a:rPr>
-            </a:br>
-            <a:r>
-              <a:rPr lang="en-US" sz="2800" dirty="0">
-                <a:solidFill>
-                  <a:srgbClr val="FFFF00"/>
-                </a:solidFill>
-              </a:rPr>
-              <a:t>Zillow (additional rental and city data)</a:t>
-            </a:r>
-            <a:br>
-              <a:rPr lang="en-US" sz="2800" dirty="0">
-                <a:solidFill>
-                  <a:srgbClr val="FFFF00"/>
-                </a:solidFill>
-              </a:rPr>
-            </a:br>
-            <a:r>
-              <a:rPr lang="en-US" sz="2800" dirty="0">
-                <a:solidFill>
-                  <a:srgbClr val="FFFF00"/>
-                </a:solidFill>
-              </a:rPr>
-              <a:t>The US Census Bureau (population statistics, rental vacancy &amp; job data)</a:t>
-            </a:r>
-          </a:p>
-        </p:txBody>
-      </p:sp>
-    </p:spTree>
-    <p:extLst>
-      <p:ext uri="{BB962C8B-B14F-4D97-AF65-F5344CB8AC3E}">
-        <p14:creationId xmlns:p14="http://schemas.microsoft.com/office/powerpoint/2010/main" val="2582390284"/>
-      </p:ext>
-    </p:extLst>
-  </p:cSld>
-  <p:clrMapOvr>
-    <a:masterClrMapping/>
-  </p:clrMapOvr>
-</p:sld>
-</file>
-
-<file path=ppt/slides/slide20.xml><?xml version="1.0" encoding="utf-8"?>
+<file path=ppt/slides/slide21.xml><?xml version="1.0" encoding="utf-8"?>
 <p:sld xmlns:a="http://schemas.openxmlformats.org/drawingml/2006/main" xmlns:r="http://schemas.openxmlformats.org/officeDocument/2006/relationships" xmlns:p="http://schemas.openxmlformats.org/presentationml/2006/main">
   <p:cSld>
     <p:spTree>
@@ -8985,7 +9226,7 @@
 </p:sld>
 </file>
 
-<file path=ppt/slides/slide21.xml><?xml version="1.0" encoding="utf-8"?>
+<file path=ppt/slides/slide22.xml><?xml version="1.0" encoding="utf-8"?>
 <p:sld xmlns:a="http://schemas.openxmlformats.org/drawingml/2006/main" xmlns:r="http://schemas.openxmlformats.org/officeDocument/2006/relationships" xmlns:p="http://schemas.openxmlformats.org/presentationml/2006/main">
   <p:cSld>
     <p:spTree>
@@ -9060,7 +9301,7 @@
         </p:nvSpPr>
         <p:spPr>
           <a:xfrm>
-            <a:off x="738235" y="4867507"/>
+            <a:off x="738234" y="5209278"/>
             <a:ext cx="10715525" cy="596694"/>
           </a:xfrm>
           <a:prstGeom prst="rect">
@@ -9093,62 +9334,72 @@
           <a:p>
             <a:pPr algn="ctr"/>
             <a:r>
-              <a:rPr lang="en-US" sz="2800" dirty="0"/>
+              <a:rPr lang="en-US" sz="2400" dirty="0"/>
               <a:t>Big cities are getting bigger and more expensive but not exclusively so.</a:t>
             </a:r>
             <a:br>
-              <a:rPr lang="en-US" sz="2800" dirty="0"/>
+              <a:rPr lang="en-US" sz="2400" dirty="0"/>
             </a:br>
             <a:r>
-              <a:rPr lang="en-US" sz="2800" dirty="0"/>
+              <a:rPr lang="en-US" sz="2400" dirty="0"/>
               <a:t>(Houston, Dallas, </a:t>
             </a:r>
             <a:r>
-              <a:rPr lang="en-US" sz="2800" dirty="0" err="1"/>
+              <a:rPr lang="en-US" sz="2400" dirty="0" err="1"/>
               <a:t>etc</a:t>
             </a:r>
             <a:r>
-              <a:rPr lang="en-US" sz="2800" dirty="0"/>
+              <a:rPr lang="en-US" sz="2400" dirty="0"/>
               <a:t>).</a:t>
             </a:r>
-          </a:p>
-          <a:p>
-            <a:pPr algn="ctr"/>
-            <a:endParaRPr lang="en-US" sz="2800" dirty="0"/>
-          </a:p>
-          <a:p>
-            <a:pPr algn="ctr"/>
-            <a:r>
-              <a:rPr lang="en-US" sz="2800" dirty="0"/>
-              <a:t>A lot of that growth is out west.</a:t>
-            </a:r>
             <a:br>
-              <a:rPr lang="en-US" sz="2800" dirty="0"/>
-            </a:br>
-            <a:r>
-              <a:rPr lang="en-US" sz="2800" dirty="0"/>
-              <a:t>(11 of the 20 largest cities)</a:t>
-            </a:r>
-            <a:br>
-              <a:rPr lang="en-US" sz="2800" dirty="0"/>
+              <a:rPr lang="en-US" sz="2400" dirty="0"/>
             </a:br>
             <a:br>
-              <a:rPr lang="en-US" sz="2800" dirty="0"/>
+              <a:rPr lang="en-US" sz="2400" dirty="0"/>
             </a:br>
             <a:r>
-              <a:rPr lang="en-US" sz="2800" dirty="0"/>
+              <a:rPr lang="en-US" sz="2400" dirty="0"/>
+              <a:t>What were once “smaller” cities aren’t so small anymore, and their rental pricing reflects that.</a:t>
+            </a:r>
+          </a:p>
+          <a:p>
+            <a:pPr algn="ctr"/>
+            <a:endParaRPr lang="en-US" sz="2400" dirty="0"/>
+          </a:p>
+          <a:p>
+            <a:pPr algn="ctr"/>
+            <a:r>
+              <a:rPr lang="en-US" sz="2400" dirty="0"/>
+              <a:t>A lot of that growth is out west.</a:t>
+            </a:r>
+            <a:br>
+              <a:rPr lang="en-US" sz="2400" dirty="0"/>
+            </a:br>
+            <a:r>
+              <a:rPr lang="en-US" sz="2400" dirty="0"/>
+              <a:t>(11 of the 20 largest cities)</a:t>
+            </a:r>
+            <a:br>
+              <a:rPr lang="en-US" sz="2400" dirty="0"/>
+            </a:br>
+            <a:br>
+              <a:rPr lang="en-US" sz="2400" dirty="0"/>
+            </a:br>
+            <a:r>
+              <a:rPr lang="en-US" sz="2400" dirty="0"/>
               <a:t>We’re renting more with fewer choices in our biggest cities.</a:t>
             </a:r>
           </a:p>
           <a:p>
             <a:pPr algn="ctr"/>
-            <a:endParaRPr lang="en-US" sz="2800" dirty="0"/>
+            <a:endParaRPr lang="en-US" sz="2400" dirty="0"/>
           </a:p>
           <a:p>
             <a:pPr algn="ctr"/>
             <a:r>
-              <a:rPr lang="en-US" sz="2800" dirty="0"/>
-              <a:t>The data used here is a deep rabbit hole.</a:t>
+              <a:rPr lang="en-US" sz="2400" dirty="0"/>
+              <a:t>The data used here is something of a rabbit hole.  In answering one question related to city size, rental data, and other economic factors, we often found ourselves asking even more questions as a result.</a:t>
             </a:r>
             <a:br>
               <a:rPr lang="en-US" sz="2800" dirty="0"/>
@@ -9161,6 +9412,78 @@
     <p:extLst>
       <p:ext uri="{BB962C8B-B14F-4D97-AF65-F5344CB8AC3E}">
         <p14:creationId xmlns:p14="http://schemas.microsoft.com/office/powerpoint/2010/main" val="2512645634"/>
+      </p:ext>
+    </p:extLst>
+  </p:cSld>
+  <p:clrMapOvr>
+    <a:masterClrMapping/>
+  </p:clrMapOvr>
+</p:sld>
+</file>
+
+<file path=ppt/slides/slide23.xml><?xml version="1.0" encoding="utf-8"?>
+<p:sld xmlns:a="http://schemas.openxmlformats.org/drawingml/2006/main" xmlns:r="http://schemas.openxmlformats.org/officeDocument/2006/relationships" xmlns:p="http://schemas.openxmlformats.org/presentationml/2006/main">
+  <p:cSld>
+    <p:spTree>
+      <p:nvGrpSpPr>
+        <p:cNvPr id="1" name=""/>
+        <p:cNvGrpSpPr/>
+        <p:nvPr/>
+      </p:nvGrpSpPr>
+      <p:grpSpPr>
+        <a:xfrm>
+          <a:off x="0" y="0"/>
+          <a:ext cx="0" cy="0"/>
+          <a:chOff x="0" y="0"/>
+          <a:chExt cx="0" cy="0"/>
+        </a:xfrm>
+      </p:grpSpPr>
+      <p:sp>
+        <p:nvSpPr>
+          <p:cNvPr id="2" name="Title 1">
+            <a:extLst>
+              <a:ext uri="{FF2B5EF4-FFF2-40B4-BE49-F238E27FC236}">
+                <a16:creationId xmlns:a16="http://schemas.microsoft.com/office/drawing/2014/main" id="{D2B2D5AA-1A0B-485A-B6FC-427A891DA11C}"/>
+              </a:ext>
+            </a:extLst>
+          </p:cNvPr>
+          <p:cNvSpPr>
+            <a:spLocks noGrp="1"/>
+          </p:cNvSpPr>
+          <p:nvPr>
+            <p:ph type="ctrTitle"/>
+          </p:nvPr>
+        </p:nvSpPr>
+        <p:spPr>
+          <a:xfrm>
+            <a:off x="738237" y="2647562"/>
+            <a:ext cx="10715525" cy="596694"/>
+          </a:xfrm>
+        </p:spPr>
+        <p:txBody>
+          <a:bodyPr/>
+          <a:lstStyle/>
+          <a:p>
+            <a:pPr algn="ctr"/>
+            <a:r>
+              <a:rPr lang="en-US" sz="4400" dirty="0">
+                <a:solidFill>
+                  <a:srgbClr val="FFFF00"/>
+                </a:solidFill>
+              </a:rPr>
+              <a:t>Questions &amp; Comments</a:t>
+            </a:r>
+            <a:br>
+              <a:rPr lang="en-US" sz="2800" dirty="0"/>
+            </a:br>
+            <a:endParaRPr lang="en-US" sz="2800" dirty="0"/>
+          </a:p>
+        </p:txBody>
+      </p:sp>
+    </p:spTree>
+    <p:extLst>
+      <p:ext uri="{BB962C8B-B14F-4D97-AF65-F5344CB8AC3E}">
+        <p14:creationId xmlns:p14="http://schemas.microsoft.com/office/powerpoint/2010/main" val="3944698950"/>
       </p:ext>
     </p:extLst>
   </p:cSld>
@@ -9205,7 +9528,7 @@
         </p:nvSpPr>
         <p:spPr>
           <a:xfrm>
-            <a:off x="704850" y="503592"/>
+            <a:off x="704850" y="4777012"/>
             <a:ext cx="10782300" cy="998638"/>
           </a:xfrm>
         </p:spPr>
@@ -9216,7 +9539,7 @@
             <a:pPr algn="ctr"/>
             <a:r>
               <a:rPr lang="en-US" sz="2800" dirty="0"/>
-              <a:t>Tools utilized in this project:</a:t>
+              <a:t>Development tools utilized in this project:</a:t>
             </a:r>
             <a:br>
               <a:rPr lang="en-US" sz="2800" dirty="0"/>
@@ -9230,8 +9553,15 @@
                   <a:srgbClr val="FFFF00"/>
                 </a:solidFill>
               </a:rPr>
-              <a:t>Python | </a:t>
-            </a:r>
+              <a:t>Python</a:t>
+            </a:r>
+            <a:br>
+              <a:rPr lang="en-US" sz="2800" dirty="0">
+                <a:solidFill>
+                  <a:srgbClr val="FFFF00"/>
+                </a:solidFill>
+              </a:rPr>
+            </a:br>
             <a:r>
               <a:rPr lang="en-US" sz="2800" dirty="0" err="1">
                 <a:solidFill>
@@ -9240,13 +9570,20 @@
               </a:rPr>
               <a:t>Jupyter</a:t>
             </a:r>
-            <a:r>
+            <a:br>
               <a:rPr lang="en-US" sz="2800" dirty="0">
                 <a:solidFill>
                   <a:srgbClr val="FFFF00"/>
                 </a:solidFill>
               </a:rPr>
-              <a:t> | Pandas/</a:t>
+            </a:br>
+            <a:r>
+              <a:rPr lang="en-US" sz="2800" dirty="0">
+                <a:solidFill>
+                  <a:srgbClr val="FFFF00"/>
+                </a:solidFill>
+              </a:rPr>
+              <a:t>Pandas/</a:t>
             </a:r>
             <a:r>
               <a:rPr lang="en-US" sz="2800" dirty="0" err="1">
@@ -9256,47 +9593,117 @@
               </a:rPr>
               <a:t>Numpy</a:t>
             </a:r>
-            <a:r>
+            <a:br>
               <a:rPr lang="en-US" sz="2800" dirty="0">
                 <a:solidFill>
                   <a:srgbClr val="FFFF00"/>
                 </a:solidFill>
               </a:rPr>
-              <a:t> | Matplotlib | Google Maps API | Plotly.JS</a:t>
-            </a:r>
-          </a:p>
-        </p:txBody>
-      </p:sp>
-      <p:pic>
-        <p:nvPicPr>
-          <p:cNvPr id="4" name="Picture 3">
-            <a:extLst>
-              <a:ext uri="{FF2B5EF4-FFF2-40B4-BE49-F238E27FC236}">
-                <a16:creationId xmlns:a16="http://schemas.microsoft.com/office/drawing/2014/main" id="{A36DB6D0-DA90-45DB-B7D2-A358C2A28321}"/>
-              </a:ext>
-            </a:extLst>
-          </p:cNvPr>
-          <p:cNvPicPr>
-            <a:picLocks noChangeAspect="1"/>
-          </p:cNvPicPr>
-          <p:nvPr/>
-        </p:nvPicPr>
-        <p:blipFill>
-          <a:blip r:embed="rId2"/>
-          <a:stretch>
-            <a:fillRect/>
-          </a:stretch>
-        </p:blipFill>
-        <p:spPr>
-          <a:xfrm>
-            <a:off x="1525022" y="1819469"/>
-            <a:ext cx="9141955" cy="4382684"/>
-          </a:xfrm>
-          <a:prstGeom prst="rect">
-            <a:avLst/>
-          </a:prstGeom>
-        </p:spPr>
-      </p:pic>
+            </a:br>
+            <a:r>
+              <a:rPr lang="en-US" sz="2800" dirty="0">
+                <a:solidFill>
+                  <a:srgbClr val="FFFF00"/>
+                </a:solidFill>
+              </a:rPr>
+              <a:t>Matplotlib</a:t>
+            </a:r>
+            <a:br>
+              <a:rPr lang="en-US" sz="2800" dirty="0">
+                <a:solidFill>
+                  <a:srgbClr val="FFFF00"/>
+                </a:solidFill>
+              </a:rPr>
+            </a:br>
+            <a:r>
+              <a:rPr lang="en-US" sz="2800" dirty="0">
+                <a:solidFill>
+                  <a:srgbClr val="FFFF00"/>
+                </a:solidFill>
+              </a:rPr>
+              <a:t>Google Maps API</a:t>
+            </a:r>
+            <a:br>
+              <a:rPr lang="en-US" sz="2800" dirty="0">
+                <a:solidFill>
+                  <a:srgbClr val="FFFF00"/>
+                </a:solidFill>
+              </a:rPr>
+            </a:br>
+            <a:r>
+              <a:rPr lang="en-US" sz="2800" dirty="0">
+                <a:solidFill>
+                  <a:srgbClr val="FFFF00"/>
+                </a:solidFill>
+              </a:rPr>
+              <a:t>Plotly.JS</a:t>
+            </a:r>
+            <a:br>
+              <a:rPr lang="en-US" sz="2800" dirty="0">
+                <a:solidFill>
+                  <a:srgbClr val="FFFF00"/>
+                </a:solidFill>
+              </a:rPr>
+            </a:br>
+            <a:br>
+              <a:rPr lang="en-US" sz="2800" dirty="0">
+                <a:solidFill>
+                  <a:srgbClr val="FFFF00"/>
+                </a:solidFill>
+              </a:rPr>
+            </a:br>
+            <a:r>
+              <a:rPr lang="en-US" sz="2000" dirty="0"/>
+              <a:t>Data cleaning was relatively straight-forward with only a few minor formatting issues to correct within certain data sets (converting values to floats, reorganizing table data for optimal use, </a:t>
+            </a:r>
+            <a:r>
+              <a:rPr lang="en-US" sz="2000" dirty="0" err="1"/>
+              <a:t>etc</a:t>
+            </a:r>
+            <a:r>
+              <a:rPr lang="en-US" sz="2000" dirty="0"/>
+              <a:t>).</a:t>
+            </a:r>
+            <a:br>
+              <a:rPr lang="en-US" sz="2000" dirty="0"/>
+            </a:br>
+            <a:br>
+              <a:rPr lang="en-US" sz="2000" dirty="0"/>
+            </a:br>
+            <a:r>
+              <a:rPr lang="en-US" sz="2000" dirty="0"/>
+              <a:t>With rental data for over 17k individual cities available, the .loc and .</a:t>
+            </a:r>
+            <a:r>
+              <a:rPr lang="en-US" sz="2000" dirty="0" err="1"/>
+              <a:t>iloc</a:t>
+            </a:r>
+            <a:r>
+              <a:rPr lang="en-US" sz="2000" dirty="0"/>
+              <a:t> features within Pandas were used to isolate data for individual cities in the various data graphs in this project (heavily).</a:t>
+            </a:r>
+            <a:br>
+              <a:rPr lang="en-US" sz="2800" dirty="0">
+                <a:solidFill>
+                  <a:srgbClr val="FFFF00"/>
+                </a:solidFill>
+              </a:rPr>
+            </a:br>
+            <a:br>
+              <a:rPr lang="en-US" sz="2800" dirty="0">
+                <a:solidFill>
+                  <a:srgbClr val="FFFF00"/>
+                </a:solidFill>
+              </a:rPr>
+            </a:br>
+            <a:endParaRPr lang="en-US" sz="2800" dirty="0">
+              <a:solidFill>
+                <a:srgbClr val="FFFF00"/>
+              </a:solidFill>
+            </a:endParaRPr>
+          </a:p>
+        </p:txBody>
+      </p:sp>
     </p:spTree>
     <p:extLst>
       <p:ext uri="{BB962C8B-B14F-4D97-AF65-F5344CB8AC3E}">
@@ -9345,7 +9752,7 @@
         </p:nvSpPr>
         <p:spPr>
           <a:xfrm>
-            <a:off x="704849" y="503592"/>
+            <a:off x="704849" y="820833"/>
             <a:ext cx="10782300" cy="998638"/>
           </a:xfrm>
         </p:spPr>
@@ -9356,22 +9763,44 @@
             <a:pPr algn="ctr"/>
             <a:r>
               <a:rPr lang="en-US" sz="2800" dirty="0"/>
-              <a:t>Sample </a:t>
-            </a:r>
-            <a:r>
-              <a:rPr lang="en-US" sz="2800" dirty="0" err="1"/>
-              <a:t>Plotly</a:t>
-            </a:r>
-            <a:r>
-              <a:rPr lang="en-US" sz="2800" dirty="0"/>
-              <a:t> code</a:t>
+              <a:t>About Plotly.JS</a:t>
             </a:r>
             <a:br>
               <a:rPr lang="en-US" sz="2800" dirty="0"/>
             </a:br>
             <a:br>
-              <a:rPr lang="en-US" sz="2800" dirty="0"/>
+              <a:rPr lang="en-US" sz="1600" dirty="0"/>
             </a:br>
+            <a:r>
+              <a:rPr lang="en-US" sz="1600" dirty="0"/>
+              <a:t>Plotly.JS is an open-source graphing library developed for </a:t>
+            </a:r>
+            <a:r>
+              <a:rPr lang="en-US" sz="1600" dirty="0" err="1"/>
+              <a:t>Javascript</a:t>
+            </a:r>
+            <a:r>
+              <a:rPr lang="en-US" sz="1600" dirty="0"/>
+              <a:t> that is also compatible with Python and </a:t>
+            </a:r>
+            <a:r>
+              <a:rPr lang="en-US" sz="1600" dirty="0" err="1"/>
+              <a:t>Jupyter</a:t>
+            </a:r>
+            <a:r>
+              <a:rPr lang="en-US" sz="1600" dirty="0"/>
+              <a:t>.  It allows developers to build roughly 20 different chart types, including 3D charts and statistical graphs.  </a:t>
+            </a:r>
+            <a:br>
+              <a:rPr lang="en-US" sz="1600" dirty="0"/>
+            </a:br>
+            <a:br>
+              <a:rPr lang="en-US" sz="1600" dirty="0"/>
+            </a:br>
+            <a:r>
+              <a:rPr lang="en-US" sz="1600" dirty="0"/>
+              <a:t>It’s ideally suited for building interactive data displays for websites; however, they will appear static when used outside of a web browser, such as this presentation.</a:t>
+            </a:r>
             <a:endParaRPr lang="en-US" sz="2800" dirty="0">
               <a:solidFill>
                 <a:srgbClr val="FFFF00"/>
@@ -9382,10 +9811,10 @@
       </p:sp>
       <p:pic>
         <p:nvPicPr>
-          <p:cNvPr id="5" name="Picture 4">
-            <a:extLst>
-              <a:ext uri="{FF2B5EF4-FFF2-40B4-BE49-F238E27FC236}">
-                <a16:creationId xmlns:a16="http://schemas.microsoft.com/office/drawing/2014/main" id="{D30BDD72-3034-4F40-8092-48C51AAA8CF7}"/>
+          <p:cNvPr id="4" name="Picture 3">
+            <a:extLst>
+              <a:ext uri="{FF2B5EF4-FFF2-40B4-BE49-F238E27FC236}">
+                <a16:creationId xmlns:a16="http://schemas.microsoft.com/office/drawing/2014/main" id="{D100427B-F21F-4340-AAD2-FBD8D8124238}"/>
               </a:ext>
             </a:extLst>
           </p:cNvPr>
@@ -9402,8 +9831,8 @@
         </p:blipFill>
         <p:spPr>
           <a:xfrm>
-            <a:off x="2395950" y="1002911"/>
-            <a:ext cx="7400099" cy="5491186"/>
+            <a:off x="1794587" y="2230185"/>
+            <a:ext cx="8602824" cy="4124223"/>
           </a:xfrm>
           <a:prstGeom prst="rect">
             <a:avLst/>
@@ -9458,8 +9887,8 @@
         </p:nvSpPr>
         <p:spPr>
           <a:xfrm>
-            <a:off x="704850" y="1330304"/>
-            <a:ext cx="10782300" cy="4671545"/>
+            <a:off x="704849" y="783511"/>
+            <a:ext cx="10782300" cy="998638"/>
           </a:xfrm>
         </p:spPr>
         <p:txBody>
@@ -9469,114 +9898,86 @@
             <a:pPr algn="ctr"/>
             <a:r>
               <a:rPr lang="en-US" sz="2800" dirty="0"/>
-              <a:t>For this project we looked at the available data from our sources between 2011 and 2017.</a:t>
+              <a:t>Sample Plotly.JS Code</a:t>
             </a:r>
             <a:br>
               <a:rPr lang="en-US" sz="2800" dirty="0"/>
             </a:br>
             <a:br>
-              <a:rPr lang="en-US" sz="2800" dirty="0"/>
+              <a:rPr lang="en-US" sz="1600" dirty="0"/>
+            </a:br>
+            <a:r>
+              <a:rPr lang="en-US" sz="1600" dirty="0"/>
+              <a:t>The visuals generated via </a:t>
+            </a:r>
+            <a:r>
+              <a:rPr lang="en-US" sz="1600" dirty="0" err="1"/>
+              <a:t>Plotly</a:t>
+            </a:r>
+            <a:r>
+              <a:rPr lang="en-US" sz="1600" dirty="0"/>
+              <a:t> require an import of the </a:t>
+            </a:r>
+            <a:r>
+              <a:rPr lang="en-US" sz="1600" dirty="0" err="1"/>
+              <a:t>Plotly</a:t>
+            </a:r>
+            <a:r>
+              <a:rPr lang="en-US" sz="1600" dirty="0"/>
+              <a:t> code library (via pip install) as well as an “offline” mode designation when not using the library for online development or display.</a:t>
+            </a:r>
+            <a:br>
+              <a:rPr lang="en-US" sz="1600" dirty="0"/>
             </a:br>
             <a:br>
-              <a:rPr lang="en-US" sz="2800" dirty="0"/>
+              <a:rPr lang="en-US" sz="1600" dirty="0"/>
             </a:br>
             <a:r>
-              <a:rPr lang="en-US" sz="2800" dirty="0"/>
-              <a:t>We also asked ourselves a number of questions along the way:</a:t>
-            </a:r>
-            <a:br>
-              <a:rPr lang="en-US" sz="2800" dirty="0"/>
-            </a:br>
-            <a:br>
-              <a:rPr lang="en-US" sz="2800" dirty="0"/>
-            </a:br>
-            <a:br>
-              <a:rPr lang="en-US" sz="2800" dirty="0"/>
-            </a:br>
-            <a:r>
-              <a:rPr lang="en-US" sz="2800" dirty="0">
-                <a:solidFill>
-                  <a:srgbClr val="FFFF00"/>
-                </a:solidFill>
-              </a:rPr>
-              <a:t>Are rental prices higher just in bigger cities or is it a nationwide?</a:t>
-            </a:r>
-            <a:br>
-              <a:rPr lang="en-US" sz="2800" dirty="0">
-                <a:solidFill>
-                  <a:srgbClr val="FFFF00"/>
-                </a:solidFill>
-              </a:rPr>
-            </a:br>
-            <a:br>
-              <a:rPr lang="en-US" sz="2800" dirty="0">
-                <a:solidFill>
-                  <a:srgbClr val="FFFF00"/>
-                </a:solidFill>
-              </a:rPr>
-            </a:br>
-            <a:r>
-              <a:rPr lang="en-US" sz="2800" dirty="0">
-                <a:solidFill>
-                  <a:srgbClr val="FFFF00"/>
-                </a:solidFill>
-              </a:rPr>
-              <a:t>Which cities have taken off, are catching up, or have fallen behind?</a:t>
-            </a:r>
-            <a:br>
-              <a:rPr lang="en-US" sz="2800" dirty="0">
-                <a:solidFill>
-                  <a:srgbClr val="FFFF00"/>
-                </a:solidFill>
-              </a:rPr>
-            </a:br>
-            <a:br>
-              <a:rPr lang="en-US" sz="2800" dirty="0">
-                <a:solidFill>
-                  <a:srgbClr val="FFFF00"/>
-                </a:solidFill>
-              </a:rPr>
-            </a:br>
-            <a:r>
-              <a:rPr lang="en-US" sz="2800" dirty="0">
-                <a:solidFill>
-                  <a:srgbClr val="FFFF00"/>
-                </a:solidFill>
-              </a:rPr>
-              <a:t>What factors could be causing the changes that we’ve seen?</a:t>
-            </a:r>
-            <a:br>
-              <a:rPr lang="en-US" sz="2800" dirty="0">
-                <a:solidFill>
-                  <a:srgbClr val="FFFF00"/>
-                </a:solidFill>
-              </a:rPr>
-            </a:br>
-            <a:br>
-              <a:rPr lang="en-US" sz="2800" dirty="0">
-                <a:solidFill>
-                  <a:srgbClr val="FFFF00"/>
-                </a:solidFill>
-              </a:rPr>
-            </a:br>
-            <a:br>
-              <a:rPr lang="en-US" sz="2800" dirty="0">
-                <a:solidFill>
-                  <a:srgbClr val="FFFF00"/>
-                </a:solidFill>
-              </a:rPr>
-            </a:br>
-            <a:r>
-              <a:rPr lang="en-US" sz="2000" dirty="0"/>
-              <a:t>(and a lot of other questions… which we’ll come back to in a minute)</a:t>
-            </a:r>
-          </a:p>
-        </p:txBody>
-      </p:sp>
+              <a:rPr lang="en-US" sz="1600" dirty="0"/>
+              <a:t>For Python/Pandas, the charts and graphs are coded as a dictionary with a nested “data” list and a “layout” dictionary.  Customization options are plentiful.</a:t>
+            </a:r>
+            <a:endParaRPr lang="en-US" sz="2800" dirty="0">
+              <a:solidFill>
+                <a:srgbClr val="FFFF00"/>
+              </a:solidFill>
+            </a:endParaRPr>
+          </a:p>
+        </p:txBody>
+      </p:sp>
+      <p:pic>
+        <p:nvPicPr>
+          <p:cNvPr id="5" name="Picture 4">
+            <a:extLst>
+              <a:ext uri="{FF2B5EF4-FFF2-40B4-BE49-F238E27FC236}">
+                <a16:creationId xmlns:a16="http://schemas.microsoft.com/office/drawing/2014/main" id="{EB19AE95-2CF1-46AF-AFED-C5DE7978ACF9}"/>
+              </a:ext>
+            </a:extLst>
+          </p:cNvPr>
+          <p:cNvPicPr>
+            <a:picLocks noChangeAspect="1"/>
+          </p:cNvPicPr>
+          <p:nvPr/>
+        </p:nvPicPr>
+        <p:blipFill>
+          <a:blip r:embed="rId2"/>
+          <a:stretch>
+            <a:fillRect/>
+          </a:stretch>
+        </p:blipFill>
+        <p:spPr>
+          <a:xfrm>
+            <a:off x="3256929" y="2057182"/>
+            <a:ext cx="5678141" cy="4385729"/>
+          </a:xfrm>
+          <a:prstGeom prst="rect">
+            <a:avLst/>
+          </a:prstGeom>
+        </p:spPr>
+      </p:pic>
     </p:spTree>
     <p:extLst>
       <p:ext uri="{BB962C8B-B14F-4D97-AF65-F5344CB8AC3E}">
-        <p14:creationId xmlns:p14="http://schemas.microsoft.com/office/powerpoint/2010/main" val="2891696981"/>
+        <p14:creationId xmlns:p14="http://schemas.microsoft.com/office/powerpoint/2010/main" val="1778317808"/>
       </p:ext>
     </p:extLst>
   </p:cSld>
@@ -9621,7 +10022,7 @@
         </p:nvSpPr>
         <p:spPr>
           <a:xfrm>
-            <a:off x="704850" y="1740849"/>
+            <a:off x="704850" y="1330304"/>
             <a:ext cx="10782300" cy="4671545"/>
           </a:xfrm>
         </p:spPr>
@@ -9631,67 +10032,8 @@
           <a:p>
             <a:pPr algn="ctr"/>
             <a:r>
-              <a:rPr lang="en-US" sz="4400" dirty="0">
-                <a:solidFill>
-                  <a:srgbClr val="FFFF00"/>
-                </a:solidFill>
-              </a:rPr>
-              <a:t>One Minor Data Quirk:</a:t>
-            </a:r>
-            <a:br>
               <a:rPr lang="en-US" sz="2800" dirty="0"/>
-            </a:br>
-            <a:br>
-              <a:rPr lang="en-US" sz="2800" dirty="0"/>
-            </a:br>
-            <a:r>
-              <a:rPr lang="en-US" sz="2800" dirty="0"/>
-              <a:t>The Kaggle data that we used is based off rental prices in cities in the</a:t>
-            </a:r>
-            <a:br>
-              <a:rPr lang="en-US" sz="2800" dirty="0"/>
-            </a:br>
-            <a:r>
-              <a:rPr lang="en-US" sz="2800" dirty="0"/>
-              <a:t>United States which are ranked by “city” population, not “metro” population.</a:t>
-            </a:r>
-            <a:br>
-              <a:rPr lang="en-US" sz="2800" dirty="0"/>
-            </a:br>
-            <a:br>
-              <a:rPr lang="en-US" sz="2800" dirty="0"/>
-            </a:br>
-            <a:r>
-              <a:rPr lang="en-US" sz="2800" dirty="0"/>
-              <a:t>When considering the following data keep in mind it refers only to each “city” population, not to the entire “metro” area.</a:t>
-            </a:r>
-            <a:br>
-              <a:rPr lang="en-US" sz="2800" dirty="0"/>
-            </a:br>
-            <a:br>
-              <a:rPr lang="en-US" sz="2800" dirty="0"/>
-            </a:br>
-            <a:r>
-              <a:rPr lang="en-US" sz="2800" dirty="0"/>
-              <a:t>For example, Orange County is considered as part of the Los Angeles “metro” population but its rental data is broken down individually by each city.</a:t>
-            </a:r>
-            <a:br>
-              <a:rPr lang="en-US" sz="2800" dirty="0"/>
-            </a:br>
-            <a:br>
-              <a:rPr lang="en-US" sz="2800" dirty="0"/>
-            </a:br>
-            <a:r>
-              <a:rPr lang="en-US" sz="2800" dirty="0"/>
-              <a:t>Conversely, all 5 boroughs of New York are combined together, leading to a lower average overall despite considerably higher rents in various parts of the city (Manhattan, </a:t>
-            </a:r>
-            <a:r>
-              <a:rPr lang="en-US" sz="2800" dirty="0" err="1"/>
-              <a:t>etc</a:t>
-            </a:r>
-            <a:r>
-              <a:rPr lang="en-US" sz="2800" dirty="0"/>
-              <a:t>).</a:t>
+              <a:t>For this project we looked at the available data from our sources between 2011 and 2017.</a:t>
             </a:r>
             <a:br>
               <a:rPr lang="en-US" sz="2800" dirty="0"/>
@@ -9702,14 +10044,103 @@
             <a:br>
               <a:rPr lang="en-US" sz="2800" dirty="0"/>
             </a:br>
-            <a:endParaRPr lang="en-US" sz="2000" dirty="0"/>
+            <a:r>
+              <a:rPr lang="en-US" sz="2800" dirty="0"/>
+              <a:t>We also asked ourselves a number of questions along the way:</a:t>
+            </a:r>
+            <a:br>
+              <a:rPr lang="en-US" sz="2800" dirty="0"/>
+            </a:br>
+            <a:br>
+              <a:rPr lang="en-US" sz="2800" dirty="0"/>
+            </a:br>
+            <a:br>
+              <a:rPr lang="en-US" sz="2800" dirty="0"/>
+            </a:br>
+            <a:r>
+              <a:rPr lang="en-US" sz="2800" dirty="0">
+                <a:solidFill>
+                  <a:srgbClr val="FFFF00"/>
+                </a:solidFill>
+              </a:rPr>
+              <a:t>Are rental prices higher just in bigger cities or is it a nationwide trend?</a:t>
+            </a:r>
+            <a:br>
+              <a:rPr lang="en-US" sz="2800" dirty="0">
+                <a:solidFill>
+                  <a:srgbClr val="FFFF00"/>
+                </a:solidFill>
+              </a:rPr>
+            </a:br>
+            <a:br>
+              <a:rPr lang="en-US" sz="2800" dirty="0">
+                <a:solidFill>
+                  <a:srgbClr val="FFFF00"/>
+                </a:solidFill>
+              </a:rPr>
+            </a:br>
+            <a:r>
+              <a:rPr lang="en-US" sz="2800" dirty="0">
+                <a:solidFill>
+                  <a:srgbClr val="FFFF00"/>
+                </a:solidFill>
+              </a:rPr>
+              <a:t>Which cities have taken off, are catching up, or have fallen behind?</a:t>
+            </a:r>
+            <a:br>
+              <a:rPr lang="en-US" sz="2800" dirty="0">
+                <a:solidFill>
+                  <a:srgbClr val="FFFF00"/>
+                </a:solidFill>
+              </a:rPr>
+            </a:br>
+            <a:br>
+              <a:rPr lang="en-US" sz="2800" dirty="0">
+                <a:solidFill>
+                  <a:srgbClr val="FFFF00"/>
+                </a:solidFill>
+              </a:rPr>
+            </a:br>
+            <a:r>
+              <a:rPr lang="en-US" sz="2800" dirty="0">
+                <a:solidFill>
+                  <a:srgbClr val="FFFF00"/>
+                </a:solidFill>
+              </a:rPr>
+              <a:t>What factors could be causing the changes that we’ve seen?</a:t>
+            </a:r>
+            <a:br>
+              <a:rPr lang="en-US" sz="2800" dirty="0">
+                <a:solidFill>
+                  <a:srgbClr val="FFFF00"/>
+                </a:solidFill>
+              </a:rPr>
+            </a:br>
+            <a:br>
+              <a:rPr lang="en-US" sz="2800" dirty="0">
+                <a:solidFill>
+                  <a:srgbClr val="FFFF00"/>
+                </a:solidFill>
+              </a:rPr>
+            </a:br>
+            <a:br>
+              <a:rPr lang="en-US" sz="2800" dirty="0">
+                <a:solidFill>
+                  <a:srgbClr val="FFFF00"/>
+                </a:solidFill>
+              </a:rPr>
+            </a:br>
+            <a:r>
+              <a:rPr lang="en-US" sz="2000" dirty="0"/>
+              <a:t>(and a lot of other questions… which we’ll come back to in a minute)</a:t>
+            </a:r>
           </a:p>
         </p:txBody>
       </p:sp>
     </p:spTree>
     <p:extLst>
       <p:ext uri="{BB962C8B-B14F-4D97-AF65-F5344CB8AC3E}">
-        <p14:creationId xmlns:p14="http://schemas.microsoft.com/office/powerpoint/2010/main" val="2870488047"/>
+        <p14:creationId xmlns:p14="http://schemas.microsoft.com/office/powerpoint/2010/main" val="2891696981"/>
       </p:ext>
     </p:extLst>
   </p:cSld>
@@ -9754,7 +10185,148 @@
         </p:nvSpPr>
         <p:spPr>
           <a:xfrm>
-            <a:off x="738236" y="5572125"/>
+            <a:off x="704850" y="1656874"/>
+            <a:ext cx="10782300" cy="4671545"/>
+          </a:xfrm>
+        </p:spPr>
+        <p:txBody>
+          <a:bodyPr/>
+          <a:lstStyle/>
+          <a:p>
+            <a:pPr algn="ctr"/>
+            <a:br>
+              <a:rPr lang="en-US" sz="4400" dirty="0">
+                <a:solidFill>
+                  <a:srgbClr val="FFFF00"/>
+                </a:solidFill>
+              </a:rPr>
+            </a:br>
+            <a:r>
+              <a:rPr lang="en-US" sz="4400" dirty="0">
+                <a:solidFill>
+                  <a:srgbClr val="FFFF00"/>
+                </a:solidFill>
+              </a:rPr>
+              <a:t>Data Quirks:</a:t>
+            </a:r>
+            <a:br>
+              <a:rPr lang="en-US" sz="2800" dirty="0"/>
+            </a:br>
+            <a:br>
+              <a:rPr lang="en-US" sz="2800" dirty="0"/>
+            </a:br>
+            <a:r>
+              <a:rPr lang="en-US" sz="2000" dirty="0"/>
+              <a:t>The Kaggle data that was used gave us rental prices for cities in the United States which were ranked by “city” population, not “metro” population.  Accordingly, certain cities in our study ranked higher or lower than they would have had they been ranked by their total metro population.</a:t>
+            </a:r>
+            <a:br>
+              <a:rPr lang="en-US" sz="2000" dirty="0"/>
+            </a:br>
+            <a:br>
+              <a:rPr lang="en-US" sz="2000" dirty="0"/>
+            </a:br>
+            <a:r>
+              <a:rPr lang="en-US" sz="2000" dirty="0"/>
+              <a:t>For larger cities with a wider range of rental pricing, the corresponding averages come out noticeably lower than one might think they would be.</a:t>
+            </a:r>
+            <a:br>
+              <a:rPr lang="en-US" sz="2000" dirty="0"/>
+            </a:br>
+            <a:br>
+              <a:rPr lang="en-US" sz="2000" dirty="0"/>
+            </a:br>
+            <a:r>
+              <a:rPr lang="en-US" sz="2000" dirty="0"/>
+              <a:t>As an example…</a:t>
+            </a:r>
+            <a:br>
+              <a:rPr lang="en-US" sz="2000" dirty="0"/>
+            </a:br>
+            <a:br>
+              <a:rPr lang="en-US" sz="2000" dirty="0"/>
+            </a:br>
+            <a:r>
+              <a:rPr lang="en-US" sz="2000" dirty="0"/>
+              <a:t>When looking at the Zillow data specific to Manhattan rental pricing, it would easy rank among the most expensive areas to rent in currently but because it’s grouped in with the other boroughs of New York City the average for the city comes out considerably lower.</a:t>
+            </a:r>
+            <a:br>
+              <a:rPr lang="en-US" sz="2000" dirty="0"/>
+            </a:br>
+            <a:br>
+              <a:rPr lang="en-US" sz="2000" dirty="0"/>
+            </a:br>
+            <a:r>
+              <a:rPr lang="en-US" sz="2000" dirty="0"/>
+              <a:t>Similar trends were noted in cities like Los Angeles, Chicago, Boston and Washington D.C.</a:t>
+            </a:r>
+            <a:br>
+              <a:rPr lang="en-US" sz="2000" dirty="0"/>
+            </a:br>
+            <a:br>
+              <a:rPr lang="en-US" sz="2000" dirty="0"/>
+            </a:br>
+            <a:br>
+              <a:rPr lang="en-US" sz="2000" dirty="0"/>
+            </a:br>
+            <a:br>
+              <a:rPr lang="en-US" sz="2800" dirty="0"/>
+            </a:br>
+            <a:br>
+              <a:rPr lang="en-US" sz="2800" dirty="0"/>
+            </a:br>
+            <a:endParaRPr lang="en-US" sz="2000" dirty="0"/>
+          </a:p>
+        </p:txBody>
+      </p:sp>
+    </p:spTree>
+    <p:extLst>
+      <p:ext uri="{BB962C8B-B14F-4D97-AF65-F5344CB8AC3E}">
+        <p14:creationId xmlns:p14="http://schemas.microsoft.com/office/powerpoint/2010/main" val="2870488047"/>
+      </p:ext>
+    </p:extLst>
+  </p:cSld>
+  <p:clrMapOvr>
+    <a:masterClrMapping/>
+  </p:clrMapOvr>
+</p:sld>
+</file>
+
+<file path=ppt/slides/slide8.xml><?xml version="1.0" encoding="utf-8"?>
+<p:sld xmlns:a="http://schemas.openxmlformats.org/drawingml/2006/main" xmlns:r="http://schemas.openxmlformats.org/officeDocument/2006/relationships" xmlns:p="http://schemas.openxmlformats.org/presentationml/2006/main">
+  <p:cSld>
+    <p:spTree>
+      <p:nvGrpSpPr>
+        <p:cNvPr id="1" name=""/>
+        <p:cNvGrpSpPr/>
+        <p:nvPr/>
+      </p:nvGrpSpPr>
+      <p:grpSpPr>
+        <a:xfrm>
+          <a:off x="0" y="0"/>
+          <a:ext cx="0" cy="0"/>
+          <a:chOff x="0" y="0"/>
+          <a:chExt cx="0" cy="0"/>
+        </a:xfrm>
+      </p:grpSpPr>
+      <p:sp>
+        <p:nvSpPr>
+          <p:cNvPr id="2" name="Title 1">
+            <a:extLst>
+              <a:ext uri="{FF2B5EF4-FFF2-40B4-BE49-F238E27FC236}">
+                <a16:creationId xmlns:a16="http://schemas.microsoft.com/office/drawing/2014/main" id="{D2B2D5AA-1A0B-485A-B6FC-427A891DA11C}"/>
+              </a:ext>
+            </a:extLst>
+          </p:cNvPr>
+          <p:cNvSpPr>
+            <a:spLocks noGrp="1"/>
+          </p:cNvSpPr>
+          <p:nvPr>
+            <p:ph type="ctrTitle"/>
+          </p:nvPr>
+        </p:nvSpPr>
+        <p:spPr>
+          <a:xfrm>
+            <a:off x="738235" y="5908027"/>
             <a:ext cx="10715525" cy="596694"/>
           </a:xfrm>
         </p:spPr>
@@ -9765,7 +10337,17 @@
             <a:pPr algn="ctr"/>
             <a:r>
               <a:rPr lang="en-US" sz="2000" dirty="0"/>
-              <a:t>Average annual rent increase:  1.7% among the 17K cities surveyed</a:t>
+              <a:t>Average annual rent increase:  1.7%</a:t>
+            </a:r>
+            <a:br>
+              <a:rPr lang="en-US" sz="2000" dirty="0"/>
+            </a:br>
+            <a:br>
+              <a:rPr lang="en-US" sz="2000" dirty="0"/>
+            </a:br>
+            <a:r>
+              <a:rPr lang="en-US" sz="2000" dirty="0"/>
+              <a:t>The average American paid $1467 in rent per month as of January 2017.</a:t>
             </a:r>
             <a:endParaRPr lang="en-US" sz="2000" dirty="0">
               <a:solidFill>
@@ -9825,7 +10407,7 @@
             <a:pPr algn="ctr"/>
             <a:r>
               <a:rPr lang="en-US" sz="2800" dirty="0"/>
-              <a:t>Let’s start with the national average.</a:t>
+              <a:t>Our base question is pretty broad, so let’s start with the national average.</a:t>
             </a:r>
             <a:endParaRPr lang="en-US" sz="2800" dirty="0">
               <a:solidFill>
@@ -9878,7 +10460,7 @@
 </p:sld>
 </file>
 
-<file path=ppt/slides/slide8.xml><?xml version="1.0" encoding="utf-8"?>
+<file path=ppt/slides/slide9.xml><?xml version="1.0" encoding="utf-8"?>
 <p:sld xmlns:a="http://schemas.openxmlformats.org/drawingml/2006/main" xmlns:r="http://schemas.openxmlformats.org/officeDocument/2006/relationships" xmlns:p="http://schemas.openxmlformats.org/presentationml/2006/main">
   <p:cSld>
     <p:spTree>
@@ -9950,7 +10532,7 @@
         </p:nvSpPr>
         <p:spPr>
           <a:xfrm>
-            <a:off x="738232" y="5693422"/>
+            <a:off x="738230" y="5982671"/>
             <a:ext cx="10715525" cy="596694"/>
           </a:xfrm>
           <a:prstGeom prst="rect">
@@ -9985,6 +10567,13 @@
             <a:r>
               <a:rPr lang="en-US" sz="2000" dirty="0"/>
               <a:t>Average annual rent increase:  3%</a:t>
+            </a:r>
+            <a:br>
+              <a:rPr lang="en-US" sz="2000" dirty="0"/>
+            </a:br>
+            <a:r>
+              <a:rPr lang="en-US" sz="2000" dirty="0"/>
+              <a:t>($1533 per month)</a:t>
             </a:r>
             <a:endParaRPr lang="en-US" sz="2000" dirty="0">
               <a:solidFill>
@@ -10028,165 +10617,6 @@
     <p:extLst>
       <p:ext uri="{BB962C8B-B14F-4D97-AF65-F5344CB8AC3E}">
         <p14:creationId xmlns:p14="http://schemas.microsoft.com/office/powerpoint/2010/main" val="225606987"/>
-      </p:ext>
-    </p:extLst>
-  </p:cSld>
-  <p:clrMapOvr>
-    <a:masterClrMapping/>
-  </p:clrMapOvr>
-</p:sld>
-</file>
-
-<file path=ppt/slides/slide9.xml><?xml version="1.0" encoding="utf-8"?>
-<p:sld xmlns:a="http://schemas.openxmlformats.org/drawingml/2006/main" xmlns:r="http://schemas.openxmlformats.org/officeDocument/2006/relationships" xmlns:p="http://schemas.openxmlformats.org/presentationml/2006/main">
-  <p:cSld>
-    <p:spTree>
-      <p:nvGrpSpPr>
-        <p:cNvPr id="1" name=""/>
-        <p:cNvGrpSpPr/>
-        <p:nvPr/>
-      </p:nvGrpSpPr>
-      <p:grpSpPr>
-        <a:xfrm>
-          <a:off x="0" y="0"/>
-          <a:ext cx="0" cy="0"/>
-          <a:chOff x="0" y="0"/>
-          <a:chExt cx="0" cy="0"/>
-        </a:xfrm>
-      </p:grpSpPr>
-      <p:sp>
-        <p:nvSpPr>
-          <p:cNvPr id="2" name="Title 1">
-            <a:extLst>
-              <a:ext uri="{FF2B5EF4-FFF2-40B4-BE49-F238E27FC236}">
-                <a16:creationId xmlns:a16="http://schemas.microsoft.com/office/drawing/2014/main" id="{D2B2D5AA-1A0B-485A-B6FC-427A891DA11C}"/>
-              </a:ext>
-            </a:extLst>
-          </p:cNvPr>
-          <p:cNvSpPr>
-            <a:spLocks noGrp="1"/>
-          </p:cNvSpPr>
-          <p:nvPr>
-            <p:ph type="ctrTitle"/>
-          </p:nvPr>
-        </p:nvSpPr>
-        <p:spPr>
-          <a:xfrm>
-            <a:off x="738236" y="5572125"/>
-            <a:ext cx="10715525" cy="596694"/>
-          </a:xfrm>
-        </p:spPr>
-        <p:txBody>
-          <a:bodyPr/>
-          <a:lstStyle/>
-          <a:p>
-            <a:pPr algn="ctr"/>
-            <a:r>
-              <a:rPr lang="en-US" sz="2000" dirty="0"/>
-              <a:t>Average annual rent increase:  3.9%</a:t>
-            </a:r>
-            <a:endParaRPr lang="en-US" sz="2000" dirty="0">
-              <a:solidFill>
-                <a:srgbClr val="FFFF00"/>
-              </a:solidFill>
-            </a:endParaRPr>
-          </a:p>
-        </p:txBody>
-      </p:sp>
-      <p:sp>
-        <p:nvSpPr>
-          <p:cNvPr id="4" name="Title 1">
-            <a:extLst>
-              <a:ext uri="{FF2B5EF4-FFF2-40B4-BE49-F238E27FC236}">
-                <a16:creationId xmlns:a16="http://schemas.microsoft.com/office/drawing/2014/main" id="{D384CF35-B8B9-41CF-8D5D-528DAF4955B3}"/>
-              </a:ext>
-            </a:extLst>
-          </p:cNvPr>
-          <p:cNvSpPr txBox="1">
-            <a:spLocks/>
-          </p:cNvSpPr>
-          <p:nvPr/>
-        </p:nvSpPr>
-        <p:spPr>
-          <a:xfrm>
-            <a:off x="738236" y="537692"/>
-            <a:ext cx="10715525" cy="596694"/>
-          </a:xfrm>
-          <a:prstGeom prst="rect">
-            <a:avLst/>
-          </a:prstGeom>
-        </p:spPr>
-        <p:txBody>
-          <a:bodyPr vert="horz" lIns="91440" tIns="45720" rIns="91440" bIns="45720" rtlCol="0" anchor="b">
-            <a:noAutofit/>
-          </a:bodyPr>
-          <a:lstStyle>
-            <a:lvl1pPr algn="l" defTabSz="914400" rtl="0" eaLnBrk="1" latinLnBrk="0" hangingPunct="1">
-              <a:lnSpc>
-                <a:spcPct val="80000"/>
-              </a:lnSpc>
-              <a:spcBef>
-                <a:spcPct val="0"/>
-              </a:spcBef>
-              <a:buNone/>
-              <a:defRPr sz="8800" kern="1200" spc="-120" baseline="0">
-                <a:solidFill>
-                  <a:schemeClr val="tx1"/>
-                </a:solidFill>
-                <a:latin typeface="+mj-lt"/>
-                <a:ea typeface="+mj-ea"/>
-                <a:cs typeface="+mj-cs"/>
-              </a:defRPr>
-            </a:lvl1pPr>
-          </a:lstStyle>
-          <a:p>
-            <a:pPr algn="ctr"/>
-            <a:r>
-              <a:rPr lang="en-US" sz="2800" dirty="0"/>
-              <a:t>How do the 20 most populous cities in the US stack up against the average nationwide?</a:t>
-            </a:r>
-            <a:endParaRPr lang="en-US" sz="2800" dirty="0">
-              <a:solidFill>
-                <a:srgbClr val="FFFF00"/>
-              </a:solidFill>
-            </a:endParaRPr>
-          </a:p>
-        </p:txBody>
-      </p:sp>
-      <p:pic>
-        <p:nvPicPr>
-          <p:cNvPr id="5" name="Picture 4">
-            <a:extLst>
-              <a:ext uri="{FF2B5EF4-FFF2-40B4-BE49-F238E27FC236}">
-                <a16:creationId xmlns:a16="http://schemas.microsoft.com/office/drawing/2014/main" id="{5CE22345-9933-4C16-8BF3-BC7195F8DC87}"/>
-              </a:ext>
-            </a:extLst>
-          </p:cNvPr>
-          <p:cNvPicPr>
-            <a:picLocks noChangeAspect="1"/>
-          </p:cNvPicPr>
-          <p:nvPr/>
-        </p:nvPicPr>
-        <p:blipFill>
-          <a:blip r:embed="rId2"/>
-          <a:stretch>
-            <a:fillRect/>
-          </a:stretch>
-        </p:blipFill>
-        <p:spPr>
-          <a:xfrm>
-            <a:off x="2762250" y="1285875"/>
-            <a:ext cx="6667500" cy="4286250"/>
-          </a:xfrm>
-          <a:prstGeom prst="rect">
-            <a:avLst/>
-          </a:prstGeom>
-        </p:spPr>
-      </p:pic>
-    </p:spTree>
-    <p:extLst>
-      <p:ext uri="{BB962C8B-B14F-4D97-AF65-F5344CB8AC3E}">
-        <p14:creationId xmlns:p14="http://schemas.microsoft.com/office/powerpoint/2010/main" val="1726307669"/>
       </p:ext>
     </p:extLst>
   </p:cSld>

</xml_diff>